<commit_message>
1) Flowcharts changed to times and added sleep states 2) Added official test results
</commit_message>
<xml_diff>
--- a/Documentation/Results/IODVS/Flowcharts.pptx
+++ b/Documentation/Results/IODVS/Flowcharts.pptx
@@ -291,7 +291,7 @@
           <a:p>
             <a:fld id="{7B943329-1151-9D43-96D9-FAE02A470F34}" type="datetimeFigureOut">
               <a:rPr lang="en-US" smtClean="0"/>
-              <a:t>8/26/2014</a:t>
+              <a:t>10/14/2014</a:t>
             </a:fld>
             <a:endParaRPr lang="en-US"/>
           </a:p>
@@ -461,7 +461,7 @@
           <a:p>
             <a:fld id="{7B943329-1151-9D43-96D9-FAE02A470F34}" type="datetimeFigureOut">
               <a:rPr lang="en-US" smtClean="0"/>
-              <a:t>8/26/2014</a:t>
+              <a:t>10/14/2014</a:t>
             </a:fld>
             <a:endParaRPr lang="en-US"/>
           </a:p>
@@ -641,7 +641,7 @@
           <a:p>
             <a:fld id="{7B943329-1151-9D43-96D9-FAE02A470F34}" type="datetimeFigureOut">
               <a:rPr lang="en-US" smtClean="0"/>
-              <a:t>8/26/2014</a:t>
+              <a:t>10/14/2014</a:t>
             </a:fld>
             <a:endParaRPr lang="en-US"/>
           </a:p>
@@ -811,7 +811,7 @@
           <a:p>
             <a:fld id="{7B943329-1151-9D43-96D9-FAE02A470F34}" type="datetimeFigureOut">
               <a:rPr lang="en-US" smtClean="0"/>
-              <a:t>8/26/2014</a:t>
+              <a:t>10/14/2014</a:t>
             </a:fld>
             <a:endParaRPr lang="en-US"/>
           </a:p>
@@ -1057,7 +1057,7 @@
           <a:p>
             <a:fld id="{7B943329-1151-9D43-96D9-FAE02A470F34}" type="datetimeFigureOut">
               <a:rPr lang="en-US" smtClean="0"/>
-              <a:t>8/26/2014</a:t>
+              <a:t>10/14/2014</a:t>
             </a:fld>
             <a:endParaRPr lang="en-US"/>
           </a:p>
@@ -1345,7 +1345,7 @@
           <a:p>
             <a:fld id="{7B943329-1151-9D43-96D9-FAE02A470F34}" type="datetimeFigureOut">
               <a:rPr lang="en-US" smtClean="0"/>
-              <a:t>8/26/2014</a:t>
+              <a:t>10/14/2014</a:t>
             </a:fld>
             <a:endParaRPr lang="en-US"/>
           </a:p>
@@ -1767,7 +1767,7 @@
           <a:p>
             <a:fld id="{7B943329-1151-9D43-96D9-FAE02A470F34}" type="datetimeFigureOut">
               <a:rPr lang="en-US" smtClean="0"/>
-              <a:t>8/26/2014</a:t>
+              <a:t>10/14/2014</a:t>
             </a:fld>
             <a:endParaRPr lang="en-US"/>
           </a:p>
@@ -1885,7 +1885,7 @@
           <a:p>
             <a:fld id="{7B943329-1151-9D43-96D9-FAE02A470F34}" type="datetimeFigureOut">
               <a:rPr lang="en-US" smtClean="0"/>
-              <a:t>8/26/2014</a:t>
+              <a:t>10/14/2014</a:t>
             </a:fld>
             <a:endParaRPr lang="en-US"/>
           </a:p>
@@ -1980,7 +1980,7 @@
           <a:p>
             <a:fld id="{7B943329-1151-9D43-96D9-FAE02A470F34}" type="datetimeFigureOut">
               <a:rPr lang="en-US" smtClean="0"/>
-              <a:t>8/26/2014</a:t>
+              <a:t>10/14/2014</a:t>
             </a:fld>
             <a:endParaRPr lang="en-US"/>
           </a:p>
@@ -2257,7 +2257,7 @@
           <a:p>
             <a:fld id="{7B943329-1151-9D43-96D9-FAE02A470F34}" type="datetimeFigureOut">
               <a:rPr lang="en-US" smtClean="0"/>
-              <a:t>8/26/2014</a:t>
+              <a:t>10/14/2014</a:t>
             </a:fld>
             <a:endParaRPr lang="en-US"/>
           </a:p>
@@ -2510,7 +2510,7 @@
           <a:p>
             <a:fld id="{7B943329-1151-9D43-96D9-FAE02A470F34}" type="datetimeFigureOut">
               <a:rPr lang="en-US" smtClean="0"/>
-              <a:t>8/26/2014</a:t>
+              <a:t>10/14/2014</a:t>
             </a:fld>
             <a:endParaRPr lang="en-US"/>
           </a:p>
@@ -2723,7 +2723,7 @@
           <a:p>
             <a:fld id="{7B943329-1151-9D43-96D9-FAE02A470F34}" type="datetimeFigureOut">
               <a:rPr lang="en-US" smtClean="0"/>
-              <a:t>8/26/2014</a:t>
+              <a:t>10/14/2014</a:t>
             </a:fld>
             <a:endParaRPr lang="en-US"/>
           </a:p>
@@ -3106,8 +3106,8 @@
         </p:nvSpPr>
         <p:spPr>
           <a:xfrm>
-            <a:off x="3566583" y="772583"/>
-            <a:ext cx="1365250" cy="539750"/>
+            <a:off x="2534709" y="772583"/>
+            <a:ext cx="1031874" cy="539750"/>
           </a:xfrm>
           <a:prstGeom prst="flowChartAlternateProcess">
             <a:avLst/>
@@ -3133,10 +3133,30 @@
           <a:p>
             <a:pPr algn="ctr"/>
             <a:r>
-              <a:rPr lang="en-US" dirty="0" smtClean="0"/>
+              <a:rPr lang="en-US" sz="1200" dirty="0" smtClean="0">
+                <a:latin typeface="Times New Roman" panose="02020603050405020304" pitchFamily="18" charset="0"/>
+                <a:cs typeface="Times New Roman" panose="02020603050405020304" pitchFamily="18" charset="0"/>
+              </a:rPr>
               <a:t>Power Up</a:t>
             </a:r>
-            <a:endParaRPr lang="en-US" dirty="0"/>
+            <a:endParaRPr lang="en-US" sz="1200" dirty="0">
+              <a:latin typeface="Times New Roman" panose="02020603050405020304" pitchFamily="18" charset="0"/>
+              <a:cs typeface="Times New Roman" panose="02020603050405020304" pitchFamily="18" charset="0"/>
+            </a:endParaRPr>
+          </a:p>
+          <a:p>
+            <a:pPr algn="ctr"/>
+            <a:r>
+              <a:rPr lang="en-US" sz="1200" dirty="0" smtClean="0">
+                <a:latin typeface="Times New Roman" panose="02020603050405020304" pitchFamily="18" charset="0"/>
+                <a:cs typeface="Times New Roman" panose="02020603050405020304" pitchFamily="18" charset="0"/>
+              </a:rPr>
+              <a:t>(10ms)</a:t>
+            </a:r>
+            <a:endParaRPr lang="en-US" sz="1200" dirty="0">
+              <a:latin typeface="Times New Roman" panose="02020603050405020304" pitchFamily="18" charset="0"/>
+              <a:cs typeface="Times New Roman" panose="02020603050405020304" pitchFamily="18" charset="0"/>
+            </a:endParaRPr>
           </a:p>
         </p:txBody>
       </p:sp>
@@ -3175,10 +3195,16 @@
           <a:p>
             <a:pPr algn="ctr"/>
             <a:r>
-              <a:rPr lang="en-US" dirty="0" smtClean="0"/>
+              <a:rPr lang="en-US" sz="1200" dirty="0" smtClean="0">
+                <a:latin typeface="Times New Roman" panose="02020603050405020304" pitchFamily="18" charset="0"/>
+                <a:cs typeface="Times New Roman" panose="02020603050405020304" pitchFamily="18" charset="0"/>
+              </a:rPr>
               <a:t>Idle</a:t>
             </a:r>
-            <a:endParaRPr lang="en-US" dirty="0"/>
+            <a:endParaRPr lang="en-US" sz="1200" dirty="0">
+              <a:latin typeface="Times New Roman" panose="02020603050405020304" pitchFamily="18" charset="0"/>
+              <a:cs typeface="Times New Roman" panose="02020603050405020304" pitchFamily="18" charset="0"/>
+            </a:endParaRPr>
           </a:p>
         </p:txBody>
       </p:sp>
@@ -3217,10 +3243,41 @@
           <a:p>
             <a:pPr algn="ctr"/>
             <a:r>
-              <a:rPr lang="en-US" dirty="0" smtClean="0"/>
-              <a:t>Write</a:t>
-            </a:r>
-            <a:endParaRPr lang="en-US" dirty="0"/>
+              <a:rPr lang="en-US" sz="1200" dirty="0" smtClean="0">
+                <a:latin typeface="Times New Roman" panose="02020603050405020304" pitchFamily="18" charset="0"/>
+                <a:cs typeface="Times New Roman" panose="02020603050405020304" pitchFamily="18" charset="0"/>
+              </a:rPr>
+              <a:t>Write Data</a:t>
+            </a:r>
+          </a:p>
+          <a:p>
+            <a:pPr algn="ctr"/>
+            <a:r>
+              <a:rPr lang="en-US" sz="1200" dirty="0" smtClean="0">
+                <a:latin typeface="Times New Roman" panose="02020603050405020304" pitchFamily="18" charset="0"/>
+                <a:cs typeface="Times New Roman" panose="02020603050405020304" pitchFamily="18" charset="0"/>
+              </a:rPr>
+              <a:t>(0 </a:t>
+            </a:r>
+            <a:r>
+              <a:rPr lang="en-US" sz="1200" dirty="0" smtClean="0">
+                <a:latin typeface="Times New Roman" panose="02020603050405020304" pitchFamily="18" charset="0"/>
+                <a:cs typeface="Times New Roman" panose="02020603050405020304" pitchFamily="18" charset="0"/>
+                <a:sym typeface="Wingdings" panose="05000000000000000000" pitchFamily="2" charset="2"/>
+              </a:rPr>
+              <a:t> </a:t>
+            </a:r>
+            <a:r>
+              <a:rPr lang="en-US" sz="1200" dirty="0" smtClean="0">
+                <a:latin typeface="Times New Roman" panose="02020603050405020304" pitchFamily="18" charset="0"/>
+                <a:cs typeface="Times New Roman" panose="02020603050405020304" pitchFamily="18" charset="0"/>
+              </a:rPr>
+              <a:t>900us)</a:t>
+            </a:r>
+            <a:endParaRPr lang="en-US" sz="1200" dirty="0">
+              <a:latin typeface="Times New Roman" panose="02020603050405020304" pitchFamily="18" charset="0"/>
+              <a:cs typeface="Times New Roman" panose="02020603050405020304" pitchFamily="18" charset="0"/>
+            </a:endParaRPr>
           </a:p>
         </p:txBody>
       </p:sp>
@@ -3259,49 +3316,44 @@
           <a:p>
             <a:pPr algn="ctr"/>
             <a:r>
-              <a:rPr lang="en-US" dirty="0" smtClean="0"/>
-              <a:t>Verify</a:t>
-            </a:r>
-            <a:endParaRPr lang="en-US" dirty="0"/>
-          </a:p>
-        </p:txBody>
-      </p:sp>
-      <p:cxnSp>
-        <p:nvCxnSpPr>
-          <p:cNvPr id="9" name="Straight Arrow Connector 8"/>
-          <p:cNvCxnSpPr>
-            <a:stCxn id="2" idx="2"/>
-            <a:endCxn id="4" idx="0"/>
-          </p:cNvCxnSpPr>
-          <p:nvPr/>
-        </p:nvCxnSpPr>
-        <p:spPr>
-          <a:xfrm>
-            <a:off x="4249208" y="1312333"/>
-            <a:ext cx="0" cy="269182"/>
-          </a:xfrm>
-          <a:prstGeom prst="straightConnector1">
-            <a:avLst/>
-          </a:prstGeom>
-          <a:ln>
-            <a:tailEnd type="arrow"/>
-          </a:ln>
-        </p:spPr>
-        <p:style>
-          <a:lnRef idx="2">
-            <a:schemeClr val="dk1"/>
-          </a:lnRef>
-          <a:fillRef idx="1">
-            <a:schemeClr val="lt1"/>
-          </a:fillRef>
-          <a:effectRef idx="0">
-            <a:schemeClr val="dk1"/>
-          </a:effectRef>
-          <a:fontRef idx="minor">
-            <a:schemeClr val="dk1"/>
-          </a:fontRef>
-        </p:style>
-      </p:cxnSp>
+              <a:rPr lang="en-US" sz="1200" dirty="0" smtClean="0">
+                <a:latin typeface="Times New Roman" panose="02020603050405020304" pitchFamily="18" charset="0"/>
+                <a:cs typeface="Times New Roman" panose="02020603050405020304" pitchFamily="18" charset="0"/>
+              </a:rPr>
+              <a:t>Write Verify</a:t>
+            </a:r>
+          </a:p>
+          <a:p>
+            <a:pPr algn="ctr"/>
+            <a:r>
+              <a:rPr lang="en-US" sz="1200" dirty="0" smtClean="0">
+                <a:latin typeface="Times New Roman" panose="02020603050405020304" pitchFamily="18" charset="0"/>
+                <a:cs typeface="Times New Roman" panose="02020603050405020304" pitchFamily="18" charset="0"/>
+              </a:rPr>
+              <a:t>(0 </a:t>
+            </a:r>
+            <a:r>
+              <a:rPr lang="en-US" sz="1200" dirty="0" smtClean="0">
+                <a:latin typeface="Times New Roman" panose="02020603050405020304" pitchFamily="18" charset="0"/>
+                <a:cs typeface="Times New Roman" panose="02020603050405020304" pitchFamily="18" charset="0"/>
+                <a:sym typeface="Wingdings" panose="05000000000000000000" pitchFamily="2" charset="2"/>
+              </a:rPr>
+              <a:t> 900us</a:t>
+            </a:r>
+            <a:r>
+              <a:rPr lang="en-US" sz="1200" dirty="0" smtClean="0">
+                <a:latin typeface="Times New Roman" panose="02020603050405020304" pitchFamily="18" charset="0"/>
+                <a:cs typeface="Times New Roman" panose="02020603050405020304" pitchFamily="18" charset="0"/>
+              </a:rPr>
+              <a:t>)</a:t>
+            </a:r>
+            <a:endParaRPr lang="en-US" sz="1200" dirty="0">
+              <a:latin typeface="Times New Roman" panose="02020603050405020304" pitchFamily="18" charset="0"/>
+              <a:cs typeface="Times New Roman" panose="02020603050405020304" pitchFamily="18" charset="0"/>
+            </a:endParaRPr>
+          </a:p>
+        </p:txBody>
+      </p:sp>
       <p:cxnSp>
         <p:nvCxnSpPr>
           <p:cNvPr id="13" name="Curved Connector 12"/>
@@ -3481,13 +3533,163 @@
           <a:p>
             <a:pPr algn="ctr"/>
             <a:r>
-              <a:rPr lang="en-US" dirty="0" smtClean="0"/>
-              <a:t>Wait</a:t>
-            </a:r>
-            <a:endParaRPr lang="en-US" dirty="0"/>
-          </a:p>
-        </p:txBody>
-      </p:sp>
+              <a:rPr lang="en-US" sz="1200" dirty="0" smtClean="0">
+                <a:latin typeface="Times New Roman" panose="02020603050405020304" pitchFamily="18" charset="0"/>
+                <a:cs typeface="Times New Roman" panose="02020603050405020304" pitchFamily="18" charset="0"/>
+              </a:rPr>
+              <a:t>Write Delay</a:t>
+            </a:r>
+          </a:p>
+          <a:p>
+            <a:pPr algn="ctr"/>
+            <a:r>
+              <a:rPr lang="en-US" sz="1200" dirty="0" smtClean="0">
+                <a:latin typeface="Times New Roman" panose="02020603050405020304" pitchFamily="18" charset="0"/>
+                <a:cs typeface="Times New Roman" panose="02020603050405020304" pitchFamily="18" charset="0"/>
+              </a:rPr>
+              <a:t>(5ms)</a:t>
+            </a:r>
+            <a:endParaRPr lang="en-US" sz="1200" dirty="0">
+              <a:latin typeface="Times New Roman" panose="02020603050405020304" pitchFamily="18" charset="0"/>
+              <a:cs typeface="Times New Roman" panose="02020603050405020304" pitchFamily="18" charset="0"/>
+            </a:endParaRPr>
+          </a:p>
+        </p:txBody>
+      </p:sp>
+      <p:cxnSp>
+        <p:nvCxnSpPr>
+          <p:cNvPr id="16" name="Curved Connector 15"/>
+          <p:cNvCxnSpPr>
+            <a:stCxn id="2" idx="3"/>
+            <a:endCxn id="4" idx="0"/>
+          </p:cNvCxnSpPr>
+          <p:nvPr/>
+        </p:nvCxnSpPr>
+        <p:spPr>
+          <a:xfrm>
+            <a:off x="3566583" y="1042458"/>
+            <a:ext cx="682625" cy="539057"/>
+          </a:xfrm>
+          <a:prstGeom prst="curvedConnector2">
+            <a:avLst/>
+          </a:prstGeom>
+          <a:ln>
+            <a:tailEnd type="arrow"/>
+          </a:ln>
+        </p:spPr>
+        <p:style>
+          <a:lnRef idx="2">
+            <a:schemeClr val="dk1"/>
+          </a:lnRef>
+          <a:fillRef idx="1">
+            <a:schemeClr val="lt1"/>
+          </a:fillRef>
+          <a:effectRef idx="0">
+            <a:schemeClr val="dk1"/>
+          </a:effectRef>
+          <a:fontRef idx="minor">
+            <a:schemeClr val="dk1"/>
+          </a:fontRef>
+        </p:style>
+      </p:cxnSp>
+      <p:sp>
+        <p:nvSpPr>
+          <p:cNvPr id="20" name="Alternate Process 1"/>
+          <p:cNvSpPr/>
+          <p:nvPr/>
+        </p:nvSpPr>
+        <p:spPr>
+          <a:xfrm>
+            <a:off x="4931835" y="772583"/>
+            <a:ext cx="1031874" cy="539750"/>
+          </a:xfrm>
+          <a:prstGeom prst="flowChartAlternateProcess">
+            <a:avLst/>
+          </a:prstGeom>
+        </p:spPr>
+        <p:style>
+          <a:lnRef idx="2">
+            <a:schemeClr val="dk1"/>
+          </a:lnRef>
+          <a:fillRef idx="1">
+            <a:schemeClr val="lt1"/>
+          </a:fillRef>
+          <a:effectRef idx="0">
+            <a:schemeClr val="dk1"/>
+          </a:effectRef>
+          <a:fontRef idx="minor">
+            <a:schemeClr val="dk1"/>
+          </a:fontRef>
+        </p:style>
+        <p:txBody>
+          <a:bodyPr rtlCol="0" anchor="ctr"/>
+          <a:lstStyle/>
+          <a:p>
+            <a:pPr algn="ctr"/>
+            <a:r>
+              <a:rPr lang="en-US" sz="1200" dirty="0" smtClean="0">
+                <a:latin typeface="Times New Roman" panose="02020603050405020304" pitchFamily="18" charset="0"/>
+                <a:cs typeface="Times New Roman" panose="02020603050405020304" pitchFamily="18" charset="0"/>
+              </a:rPr>
+              <a:t>Sleep</a:t>
+            </a:r>
+            <a:endParaRPr lang="en-US" sz="1200" dirty="0">
+              <a:latin typeface="Times New Roman" panose="02020603050405020304" pitchFamily="18" charset="0"/>
+              <a:cs typeface="Times New Roman" panose="02020603050405020304" pitchFamily="18" charset="0"/>
+            </a:endParaRPr>
+          </a:p>
+          <a:p>
+            <a:pPr algn="ctr"/>
+            <a:r>
+              <a:rPr lang="en-US" sz="1200" dirty="0" smtClean="0">
+                <a:latin typeface="Times New Roman" panose="02020603050405020304" pitchFamily="18" charset="0"/>
+                <a:cs typeface="Times New Roman" panose="02020603050405020304" pitchFamily="18" charset="0"/>
+              </a:rPr>
+              <a:t>(100us)</a:t>
+            </a:r>
+            <a:endParaRPr lang="en-US" sz="1200" dirty="0">
+              <a:latin typeface="Times New Roman" panose="02020603050405020304" pitchFamily="18" charset="0"/>
+              <a:cs typeface="Times New Roman" panose="02020603050405020304" pitchFamily="18" charset="0"/>
+            </a:endParaRPr>
+          </a:p>
+        </p:txBody>
+      </p:sp>
+      <p:cxnSp>
+        <p:nvCxnSpPr>
+          <p:cNvPr id="21" name="Curved Connector 20"/>
+          <p:cNvCxnSpPr>
+            <a:stCxn id="20" idx="1"/>
+            <a:endCxn id="4" idx="0"/>
+          </p:cNvCxnSpPr>
+          <p:nvPr/>
+        </p:nvCxnSpPr>
+        <p:spPr>
+          <a:xfrm rot="10800000" flipV="1">
+            <a:off x="4249209" y="1042457"/>
+            <a:ext cx="682627" cy="539057"/>
+          </a:xfrm>
+          <a:prstGeom prst="curvedConnector2">
+            <a:avLst/>
+          </a:prstGeom>
+          <a:ln>
+            <a:tailEnd type="arrow"/>
+          </a:ln>
+        </p:spPr>
+        <p:style>
+          <a:lnRef idx="2">
+            <a:schemeClr val="dk1"/>
+          </a:lnRef>
+          <a:fillRef idx="1">
+            <a:schemeClr val="lt1"/>
+          </a:fillRef>
+          <a:effectRef idx="0">
+            <a:schemeClr val="dk1"/>
+          </a:effectRef>
+          <a:fontRef idx="minor">
+            <a:schemeClr val="dk1"/>
+          </a:fontRef>
+        </p:style>
+      </p:cxnSp>
     </p:spTree>
     <p:extLst>
       <p:ext uri="{BB962C8B-B14F-4D97-AF65-F5344CB8AC3E}">
@@ -3553,10 +3755,26 @@
           <a:p>
             <a:pPr algn="ctr"/>
             <a:r>
-              <a:rPr lang="en-US" dirty="0" smtClean="0"/>
+              <a:rPr lang="en-US" sz="1200" dirty="0" smtClean="0">
+                <a:latin typeface="Times New Roman" panose="02020603050405020304" pitchFamily="18" charset="0"/>
+                <a:cs typeface="Times New Roman" panose="02020603050405020304" pitchFamily="18" charset="0"/>
+              </a:rPr>
               <a:t>Power Up</a:t>
             </a:r>
-            <a:endParaRPr lang="en-US" dirty="0"/>
+          </a:p>
+          <a:p>
+            <a:pPr algn="ctr"/>
+            <a:r>
+              <a:rPr lang="en-US" sz="1200" dirty="0" smtClean="0">
+                <a:latin typeface="Times New Roman" panose="02020603050405020304" pitchFamily="18" charset="0"/>
+                <a:cs typeface="Times New Roman" panose="02020603050405020304" pitchFamily="18" charset="0"/>
+              </a:rPr>
+              <a:t>(10ms)</a:t>
+            </a:r>
+            <a:endParaRPr lang="en-US" sz="1200" dirty="0">
+              <a:latin typeface="Times New Roman" panose="02020603050405020304" pitchFamily="18" charset="0"/>
+              <a:cs typeface="Times New Roman" panose="02020603050405020304" pitchFamily="18" charset="0"/>
+            </a:endParaRPr>
           </a:p>
         </p:txBody>
       </p:sp>
@@ -3595,10 +3813,16 @@
           <a:p>
             <a:pPr algn="ctr"/>
             <a:r>
-              <a:rPr lang="en-US" dirty="0" smtClean="0"/>
+              <a:rPr lang="en-US" sz="1200" dirty="0" smtClean="0">
+                <a:latin typeface="Times New Roman" panose="02020603050405020304" pitchFamily="18" charset="0"/>
+                <a:cs typeface="Times New Roman" panose="02020603050405020304" pitchFamily="18" charset="0"/>
+              </a:rPr>
               <a:t>Idle</a:t>
             </a:r>
-            <a:endParaRPr lang="en-US" dirty="0"/>
+            <a:endParaRPr lang="en-US" sz="1200" dirty="0">
+              <a:latin typeface="Times New Roman" panose="02020603050405020304" pitchFamily="18" charset="0"/>
+              <a:cs typeface="Times New Roman" panose="02020603050405020304" pitchFamily="18" charset="0"/>
+            </a:endParaRPr>
           </a:p>
         </p:txBody>
       </p:sp>
@@ -3637,10 +3861,37 @@
           <a:p>
             <a:pPr algn="ctr"/>
             <a:r>
-              <a:rPr lang="en-US" dirty="0" smtClean="0"/>
-              <a:t>Subsector Erase</a:t>
-            </a:r>
-            <a:endParaRPr lang="en-US" dirty="0"/>
+              <a:rPr lang="en-US" sz="1200" dirty="0" smtClean="0">
+                <a:latin typeface="Times New Roman" panose="02020603050405020304" pitchFamily="18" charset="0"/>
+                <a:cs typeface="Times New Roman" panose="02020603050405020304" pitchFamily="18" charset="0"/>
+              </a:rPr>
+              <a:t>Sector Erase </a:t>
+            </a:r>
+            <a:r>
+              <a:rPr lang="en-US" sz="1200" dirty="0" err="1" smtClean="0">
+                <a:latin typeface="Times New Roman" panose="02020603050405020304" pitchFamily="18" charset="0"/>
+                <a:cs typeface="Times New Roman" panose="02020603050405020304" pitchFamily="18" charset="0"/>
+              </a:rPr>
+              <a:t>Cmd</a:t>
+            </a:r>
+            <a:endParaRPr lang="en-US" sz="1200" dirty="0" smtClean="0">
+              <a:latin typeface="Times New Roman" panose="02020603050405020304" pitchFamily="18" charset="0"/>
+              <a:cs typeface="Times New Roman" panose="02020603050405020304" pitchFamily="18" charset="0"/>
+            </a:endParaRPr>
+          </a:p>
+          <a:p>
+            <a:pPr algn="ctr"/>
+            <a:r>
+              <a:rPr lang="en-US" sz="1200" dirty="0" smtClean="0">
+                <a:latin typeface="Times New Roman" panose="02020603050405020304" pitchFamily="18" charset="0"/>
+                <a:cs typeface="Times New Roman" panose="02020603050405020304" pitchFamily="18" charset="0"/>
+              </a:rPr>
+              <a:t>(5us)</a:t>
+            </a:r>
+            <a:endParaRPr lang="en-US" sz="1200" dirty="0">
+              <a:latin typeface="Times New Roman" panose="02020603050405020304" pitchFamily="18" charset="0"/>
+              <a:cs typeface="Times New Roman" panose="02020603050405020304" pitchFamily="18" charset="0"/>
+            </a:endParaRPr>
           </a:p>
         </p:txBody>
       </p:sp>
@@ -3679,10 +3930,16 @@
           <a:p>
             <a:pPr algn="ctr"/>
             <a:r>
-              <a:rPr lang="en-US" dirty="0" smtClean="0"/>
+              <a:rPr lang="en-US" sz="1200" dirty="0" smtClean="0">
+                <a:latin typeface="Times New Roman" panose="02020603050405020304" pitchFamily="18" charset="0"/>
+                <a:cs typeface="Times New Roman" panose="02020603050405020304" pitchFamily="18" charset="0"/>
+              </a:rPr>
               <a:t>Verify</a:t>
             </a:r>
-            <a:endParaRPr lang="en-US" dirty="0"/>
+            <a:endParaRPr lang="en-US" sz="1200" dirty="0">
+              <a:latin typeface="Times New Roman" panose="02020603050405020304" pitchFamily="18" charset="0"/>
+              <a:cs typeface="Times New Roman" panose="02020603050405020304" pitchFamily="18" charset="0"/>
+            </a:endParaRPr>
           </a:p>
         </p:txBody>
       </p:sp>
@@ -3757,10 +4014,26 @@
           <a:p>
             <a:pPr algn="ctr"/>
             <a:r>
-              <a:rPr lang="en-US" dirty="0" smtClean="0"/>
+              <a:rPr lang="en-US" sz="1200" dirty="0" smtClean="0">
+                <a:latin typeface="Times New Roman" panose="02020603050405020304" pitchFamily="18" charset="0"/>
+                <a:cs typeface="Times New Roman" panose="02020603050405020304" pitchFamily="18" charset="0"/>
+              </a:rPr>
               <a:t>Read</a:t>
             </a:r>
-            <a:endParaRPr lang="en-US" dirty="0"/>
+          </a:p>
+          <a:p>
+            <a:pPr algn="ctr"/>
+            <a:r>
+              <a:rPr lang="en-US" sz="1200" dirty="0" smtClean="0">
+                <a:latin typeface="Times New Roman" panose="02020603050405020304" pitchFamily="18" charset="0"/>
+                <a:cs typeface="Times New Roman" panose="02020603050405020304" pitchFamily="18" charset="0"/>
+              </a:rPr>
+              <a:t>(~10ms)</a:t>
+            </a:r>
+            <a:endParaRPr lang="en-US" sz="1200" dirty="0">
+              <a:latin typeface="Times New Roman" panose="02020603050405020304" pitchFamily="18" charset="0"/>
+              <a:cs typeface="Times New Roman" panose="02020603050405020304" pitchFamily="18" charset="0"/>
+            </a:endParaRPr>
           </a:p>
         </p:txBody>
       </p:sp>
@@ -3799,10 +4072,26 @@
           <a:p>
             <a:pPr algn="ctr"/>
             <a:r>
-              <a:rPr lang="en-US" dirty="0" smtClean="0"/>
-              <a:t>Wait</a:t>
-            </a:r>
-            <a:endParaRPr lang="en-US" dirty="0"/>
+              <a:rPr lang="en-US" sz="1200" dirty="0" smtClean="0">
+                <a:latin typeface="Times New Roman" panose="02020603050405020304" pitchFamily="18" charset="0"/>
+                <a:cs typeface="Times New Roman" panose="02020603050405020304" pitchFamily="18" charset="0"/>
+              </a:rPr>
+              <a:t>Erase Delay</a:t>
+            </a:r>
+          </a:p>
+          <a:p>
+            <a:pPr algn="ctr"/>
+            <a:r>
+              <a:rPr lang="en-US" sz="1200" dirty="0" smtClean="0">
+                <a:latin typeface="Times New Roman" panose="02020603050405020304" pitchFamily="18" charset="0"/>
+                <a:cs typeface="Times New Roman" panose="02020603050405020304" pitchFamily="18" charset="0"/>
+              </a:rPr>
+              <a:t>(150ms)</a:t>
+            </a:r>
+            <a:endParaRPr lang="en-US" sz="1200" dirty="0">
+              <a:latin typeface="Times New Roman" panose="02020603050405020304" pitchFamily="18" charset="0"/>
+              <a:cs typeface="Times New Roman" panose="02020603050405020304" pitchFamily="18" charset="0"/>
+            </a:endParaRPr>
           </a:p>
         </p:txBody>
       </p:sp>
@@ -3841,10 +4130,26 @@
           <a:p>
             <a:pPr algn="ctr"/>
             <a:r>
-              <a:rPr lang="en-US" dirty="0" smtClean="0"/>
+              <a:rPr lang="en-US" sz="1200" dirty="0" smtClean="0">
+                <a:latin typeface="Times New Roman" panose="02020603050405020304" pitchFamily="18" charset="0"/>
+                <a:cs typeface="Times New Roman" panose="02020603050405020304" pitchFamily="18" charset="0"/>
+              </a:rPr>
               <a:t>Page Write</a:t>
             </a:r>
-            <a:endParaRPr lang="en-US" dirty="0"/>
+          </a:p>
+          <a:p>
+            <a:pPr algn="ctr"/>
+            <a:r>
+              <a:rPr lang="en-US" sz="1200" dirty="0" smtClean="0">
+                <a:latin typeface="Times New Roman" panose="02020603050405020304" pitchFamily="18" charset="0"/>
+                <a:cs typeface="Times New Roman" panose="02020603050405020304" pitchFamily="18" charset="0"/>
+              </a:rPr>
+              <a:t>(5ms)</a:t>
+            </a:r>
+            <a:endParaRPr lang="en-US" sz="1200" dirty="0">
+              <a:latin typeface="Times New Roman" panose="02020603050405020304" pitchFamily="18" charset="0"/>
+              <a:cs typeface="Times New Roman" panose="02020603050405020304" pitchFamily="18" charset="0"/>
+            </a:endParaRPr>
           </a:p>
         </p:txBody>
       </p:sp>
@@ -4141,10 +4446,16 @@
           <a:p>
             <a:pPr algn="ctr"/>
             <a:r>
-              <a:rPr lang="en-US" dirty="0" smtClean="0"/>
+              <a:rPr lang="en-US" sz="1200" dirty="0" smtClean="0">
+                <a:latin typeface="Times New Roman" panose="02020603050405020304" pitchFamily="18" charset="0"/>
+                <a:cs typeface="Times New Roman" panose="02020603050405020304" pitchFamily="18" charset="0"/>
+              </a:rPr>
               <a:t>Power Up</a:t>
             </a:r>
-            <a:endParaRPr lang="en-US" dirty="0"/>
+            <a:endParaRPr lang="en-US" sz="1200" dirty="0">
+              <a:latin typeface="Times New Roman" panose="02020603050405020304" pitchFamily="18" charset="0"/>
+              <a:cs typeface="Times New Roman" panose="02020603050405020304" pitchFamily="18" charset="0"/>
+            </a:endParaRPr>
           </a:p>
         </p:txBody>
       </p:sp>
@@ -4183,10 +4494,16 @@
           <a:p>
             <a:pPr algn="ctr"/>
             <a:r>
-              <a:rPr lang="en-US" dirty="0" smtClean="0"/>
+              <a:rPr lang="en-US" sz="1200" dirty="0" smtClean="0">
+                <a:latin typeface="Times New Roman" panose="02020603050405020304" pitchFamily="18" charset="0"/>
+                <a:cs typeface="Times New Roman" panose="02020603050405020304" pitchFamily="18" charset="0"/>
+              </a:rPr>
               <a:t>Initialize</a:t>
             </a:r>
-            <a:endParaRPr lang="en-US" dirty="0"/>
+            <a:endParaRPr lang="en-US" sz="1200" dirty="0">
+              <a:latin typeface="Times New Roman" panose="02020603050405020304" pitchFamily="18" charset="0"/>
+              <a:cs typeface="Times New Roman" panose="02020603050405020304" pitchFamily="18" charset="0"/>
+            </a:endParaRPr>
           </a:p>
         </p:txBody>
       </p:sp>
@@ -4225,10 +4542,16 @@
           <a:p>
             <a:pPr algn="ctr"/>
             <a:r>
-              <a:rPr lang="en-US" dirty="0" smtClean="0"/>
+              <a:rPr lang="en-US" sz="1200" dirty="0" smtClean="0">
+                <a:latin typeface="Times New Roman" panose="02020603050405020304" pitchFamily="18" charset="0"/>
+                <a:cs typeface="Times New Roman" panose="02020603050405020304" pitchFamily="18" charset="0"/>
+              </a:rPr>
               <a:t>Poll</a:t>
             </a:r>
-            <a:endParaRPr lang="en-US" dirty="0"/>
+            <a:endParaRPr lang="en-US" sz="1200" dirty="0">
+              <a:latin typeface="Times New Roman" panose="02020603050405020304" pitchFamily="18" charset="0"/>
+              <a:cs typeface="Times New Roman" panose="02020603050405020304" pitchFamily="18" charset="0"/>
+            </a:endParaRPr>
           </a:p>
         </p:txBody>
       </p:sp>
@@ -4303,10 +4626,16 @@
           <a:p>
             <a:pPr algn="ctr"/>
             <a:r>
-              <a:rPr lang="en-US" dirty="0" smtClean="0"/>
+              <a:rPr lang="en-US" sz="1200" dirty="0" smtClean="0">
+                <a:latin typeface="Times New Roman" panose="02020603050405020304" pitchFamily="18" charset="0"/>
+                <a:cs typeface="Times New Roman" panose="02020603050405020304" pitchFamily="18" charset="0"/>
+              </a:rPr>
               <a:t>Idle</a:t>
             </a:r>
-            <a:endParaRPr lang="en-US" dirty="0"/>
+            <a:endParaRPr lang="en-US" sz="1200" dirty="0">
+              <a:latin typeface="Times New Roman" panose="02020603050405020304" pitchFamily="18" charset="0"/>
+              <a:cs typeface="Times New Roman" panose="02020603050405020304" pitchFamily="18" charset="0"/>
+            </a:endParaRPr>
           </a:p>
         </p:txBody>
       </p:sp>
@@ -4345,10 +4674,16 @@
           <a:p>
             <a:pPr algn="ctr"/>
             <a:r>
-              <a:rPr lang="en-US" dirty="0" smtClean="0"/>
+              <a:rPr lang="en-US" sz="1200" dirty="0" smtClean="0">
+                <a:latin typeface="Times New Roman" panose="02020603050405020304" pitchFamily="18" charset="0"/>
+                <a:cs typeface="Times New Roman" panose="02020603050405020304" pitchFamily="18" charset="0"/>
+              </a:rPr>
               <a:t>Command</a:t>
             </a:r>
-            <a:endParaRPr lang="en-US" dirty="0"/>
+            <a:endParaRPr lang="en-US" sz="1200" dirty="0">
+              <a:latin typeface="Times New Roman" panose="02020603050405020304" pitchFamily="18" charset="0"/>
+              <a:cs typeface="Times New Roman" panose="02020603050405020304" pitchFamily="18" charset="0"/>
+            </a:endParaRPr>
           </a:p>
         </p:txBody>
       </p:sp>
@@ -4423,10 +4758,16 @@
           <a:p>
             <a:pPr algn="ctr"/>
             <a:r>
-              <a:rPr lang="en-US" dirty="0" smtClean="0"/>
+              <a:rPr lang="en-US" sz="1200" dirty="0" smtClean="0">
+                <a:latin typeface="Times New Roman" panose="02020603050405020304" pitchFamily="18" charset="0"/>
+                <a:cs typeface="Times New Roman" panose="02020603050405020304" pitchFamily="18" charset="0"/>
+              </a:rPr>
               <a:t>Completion</a:t>
             </a:r>
-            <a:endParaRPr lang="en-US" dirty="0"/>
+            <a:endParaRPr lang="en-US" sz="1200" dirty="0">
+              <a:latin typeface="Times New Roman" panose="02020603050405020304" pitchFamily="18" charset="0"/>
+              <a:cs typeface="Times New Roman" panose="02020603050405020304" pitchFamily="18" charset="0"/>
+            </a:endParaRPr>
           </a:p>
         </p:txBody>
       </p:sp>
@@ -4685,10 +5026,16 @@
           <a:p>
             <a:pPr algn="ctr"/>
             <a:r>
-              <a:rPr lang="en-US" dirty="0" smtClean="0"/>
+              <a:rPr lang="en-US" sz="1200" dirty="0" smtClean="0">
+                <a:latin typeface="Times New Roman" panose="02020603050405020304" pitchFamily="18" charset="0"/>
+                <a:cs typeface="Times New Roman" panose="02020603050405020304" pitchFamily="18" charset="0"/>
+              </a:rPr>
               <a:t>Power Up</a:t>
             </a:r>
-            <a:endParaRPr lang="en-US" dirty="0"/>
+            <a:endParaRPr lang="en-US" sz="1200" dirty="0">
+              <a:latin typeface="Times New Roman" panose="02020603050405020304" pitchFamily="18" charset="0"/>
+              <a:cs typeface="Times New Roman" panose="02020603050405020304" pitchFamily="18" charset="0"/>
+            </a:endParaRPr>
           </a:p>
         </p:txBody>
       </p:sp>
@@ -4727,10 +5074,16 @@
           <a:p>
             <a:pPr algn="ctr"/>
             <a:r>
-              <a:rPr lang="en-US" dirty="0" smtClean="0"/>
+              <a:rPr lang="en-US" sz="1200" dirty="0" smtClean="0">
+                <a:latin typeface="Times New Roman" panose="02020603050405020304" pitchFamily="18" charset="0"/>
+                <a:cs typeface="Times New Roman" panose="02020603050405020304" pitchFamily="18" charset="0"/>
+              </a:rPr>
               <a:t>Idle</a:t>
             </a:r>
-            <a:endParaRPr lang="en-US" dirty="0"/>
+            <a:endParaRPr lang="en-US" sz="1200" dirty="0">
+              <a:latin typeface="Times New Roman" panose="02020603050405020304" pitchFamily="18" charset="0"/>
+              <a:cs typeface="Times New Roman" panose="02020603050405020304" pitchFamily="18" charset="0"/>
+            </a:endParaRPr>
           </a:p>
         </p:txBody>
       </p:sp>
@@ -4769,10 +5122,16 @@
           <a:p>
             <a:pPr algn="ctr"/>
             <a:r>
-              <a:rPr lang="en-US" dirty="0" smtClean="0"/>
+              <a:rPr lang="en-US" sz="1200" dirty="0" smtClean="0">
+                <a:latin typeface="Times New Roman" panose="02020603050405020304" pitchFamily="18" charset="0"/>
+                <a:cs typeface="Times New Roman" panose="02020603050405020304" pitchFamily="18" charset="0"/>
+              </a:rPr>
               <a:t>Read</a:t>
             </a:r>
-            <a:endParaRPr lang="en-US" dirty="0"/>
+            <a:endParaRPr lang="en-US" sz="1200" dirty="0">
+              <a:latin typeface="Times New Roman" panose="02020603050405020304" pitchFamily="18" charset="0"/>
+              <a:cs typeface="Times New Roman" panose="02020603050405020304" pitchFamily="18" charset="0"/>
+            </a:endParaRPr>
           </a:p>
         </p:txBody>
       </p:sp>
@@ -4847,10 +5206,16 @@
           <a:p>
             <a:pPr algn="ctr"/>
             <a:r>
-              <a:rPr lang="en-US" dirty="0" smtClean="0"/>
+              <a:rPr lang="en-US" sz="1200" dirty="0" smtClean="0">
+                <a:latin typeface="Times New Roman" panose="02020603050405020304" pitchFamily="18" charset="0"/>
+                <a:cs typeface="Times New Roman" panose="02020603050405020304" pitchFamily="18" charset="0"/>
+              </a:rPr>
               <a:t>Command</a:t>
             </a:r>
-            <a:endParaRPr lang="en-US" dirty="0"/>
+            <a:endParaRPr lang="en-US" sz="1200" dirty="0">
+              <a:latin typeface="Times New Roman" panose="02020603050405020304" pitchFamily="18" charset="0"/>
+              <a:cs typeface="Times New Roman" panose="02020603050405020304" pitchFamily="18" charset="0"/>
+            </a:endParaRPr>
           </a:p>
         </p:txBody>
       </p:sp>
@@ -4889,10 +5254,16 @@
           <a:p>
             <a:pPr algn="ctr"/>
             <a:r>
-              <a:rPr lang="en-US" dirty="0" smtClean="0"/>
+              <a:rPr lang="en-US" sz="1200" dirty="0" smtClean="0">
+                <a:latin typeface="Times New Roman" panose="02020603050405020304" pitchFamily="18" charset="0"/>
+                <a:cs typeface="Times New Roman" panose="02020603050405020304" pitchFamily="18" charset="0"/>
+              </a:rPr>
               <a:t>Wait</a:t>
             </a:r>
-            <a:endParaRPr lang="en-US" dirty="0"/>
+            <a:endParaRPr lang="en-US" sz="1200" dirty="0">
+              <a:latin typeface="Times New Roman" panose="02020603050405020304" pitchFamily="18" charset="0"/>
+              <a:cs typeface="Times New Roman" panose="02020603050405020304" pitchFamily="18" charset="0"/>
+            </a:endParaRPr>
           </a:p>
         </p:txBody>
       </p:sp>

</xml_diff>

<commit_message>
1) Added a AppNote for the HIH6130 2) Finished flowcharts and crops
</commit_message>
<xml_diff>
--- a/Documentation/Results/IODVS/Flowcharts.pptx
+++ b/Documentation/Results/IODVS/Flowcharts.pptx
@@ -139,7 +139,7 @@
         </p:nvSpPr>
         <p:spPr>
           <a:xfrm>
-            <a:off x="685800" y="2130425"/>
+            <a:off x="685800" y="2130431"/>
             <a:ext cx="7772400" cy="1470025"/>
           </a:xfrm>
         </p:spPr>
@@ -291,7 +291,7 @@
           <a:p>
             <a:fld id="{7B943329-1151-9D43-96D9-FAE02A470F34}" type="datetimeFigureOut">
               <a:rPr lang="en-US" smtClean="0"/>
-              <a:t>10/14/2014</a:t>
+              <a:t>10/15/2014</a:t>
             </a:fld>
             <a:endParaRPr lang="en-US"/>
           </a:p>
@@ -461,7 +461,7 @@
           <a:p>
             <a:fld id="{7B943329-1151-9D43-96D9-FAE02A470F34}" type="datetimeFigureOut">
               <a:rPr lang="en-US" smtClean="0"/>
-              <a:t>10/14/2014</a:t>
+              <a:t>10/15/2014</a:t>
             </a:fld>
             <a:endParaRPr lang="en-US"/>
           </a:p>
@@ -551,7 +551,7 @@
         </p:nvSpPr>
         <p:spPr>
           <a:xfrm>
-            <a:off x="6629400" y="274638"/>
+            <a:off x="6629400" y="274644"/>
             <a:ext cx="2057400" cy="5851525"/>
           </a:xfrm>
         </p:spPr>
@@ -579,7 +579,7 @@
         </p:nvSpPr>
         <p:spPr>
           <a:xfrm>
-            <a:off x="457200" y="274638"/>
+            <a:off x="457200" y="274644"/>
             <a:ext cx="6019800" cy="5851525"/>
           </a:xfrm>
         </p:spPr>
@@ -641,7 +641,7 @@
           <a:p>
             <a:fld id="{7B943329-1151-9D43-96D9-FAE02A470F34}" type="datetimeFigureOut">
               <a:rPr lang="en-US" smtClean="0"/>
-              <a:t>10/14/2014</a:t>
+              <a:t>10/15/2014</a:t>
             </a:fld>
             <a:endParaRPr lang="en-US"/>
           </a:p>
@@ -811,7 +811,7 @@
           <a:p>
             <a:fld id="{7B943329-1151-9D43-96D9-FAE02A470F34}" type="datetimeFigureOut">
               <a:rPr lang="en-US" smtClean="0"/>
-              <a:t>10/14/2014</a:t>
+              <a:t>10/15/2014</a:t>
             </a:fld>
             <a:endParaRPr lang="en-US"/>
           </a:p>
@@ -901,7 +901,7 @@
         </p:nvSpPr>
         <p:spPr>
           <a:xfrm>
-            <a:off x="722313" y="4406900"/>
+            <a:off x="722313" y="4406906"/>
             <a:ext cx="7772400" cy="1362075"/>
           </a:xfrm>
         </p:spPr>
@@ -1057,7 +1057,7 @@
           <a:p>
             <a:fld id="{7B943329-1151-9D43-96D9-FAE02A470F34}" type="datetimeFigureOut">
               <a:rPr lang="en-US" smtClean="0"/>
-              <a:t>10/14/2014</a:t>
+              <a:t>10/15/2014</a:t>
             </a:fld>
             <a:endParaRPr lang="en-US"/>
           </a:p>
@@ -1170,7 +1170,7 @@
         </p:nvSpPr>
         <p:spPr>
           <a:xfrm>
-            <a:off x="457200" y="1600200"/>
+            <a:off x="457200" y="1600206"/>
             <a:ext cx="4038600" cy="4525963"/>
           </a:xfrm>
         </p:spPr>
@@ -1255,7 +1255,7 @@
         </p:nvSpPr>
         <p:spPr>
           <a:xfrm>
-            <a:off x="4648200" y="1600200"/>
+            <a:off x="4648200" y="1600206"/>
             <a:ext cx="4038600" cy="4525963"/>
           </a:xfrm>
         </p:spPr>
@@ -1345,7 +1345,7 @@
           <a:p>
             <a:fld id="{7B943329-1151-9D43-96D9-FAE02A470F34}" type="datetimeFigureOut">
               <a:rPr lang="en-US" smtClean="0"/>
-              <a:t>10/14/2014</a:t>
+              <a:t>10/15/2014</a:t>
             </a:fld>
             <a:endParaRPr lang="en-US"/>
           </a:p>
@@ -1613,7 +1613,7 @@
         <p:spPr>
           <a:xfrm>
             <a:off x="4645025" y="1535113"/>
-            <a:ext cx="4041775" cy="639762"/>
+            <a:ext cx="4041776" cy="639762"/>
           </a:xfrm>
         </p:spPr>
         <p:txBody>
@@ -1678,7 +1678,7 @@
         <p:spPr>
           <a:xfrm>
             <a:off x="4645025" y="2174875"/>
-            <a:ext cx="4041775" cy="3951288"/>
+            <a:ext cx="4041776" cy="3951288"/>
           </a:xfrm>
         </p:spPr>
         <p:txBody>
@@ -1767,7 +1767,7 @@
           <a:p>
             <a:fld id="{7B943329-1151-9D43-96D9-FAE02A470F34}" type="datetimeFigureOut">
               <a:rPr lang="en-US" smtClean="0"/>
-              <a:t>10/14/2014</a:t>
+              <a:t>10/15/2014</a:t>
             </a:fld>
             <a:endParaRPr lang="en-US"/>
           </a:p>
@@ -1885,7 +1885,7 @@
           <a:p>
             <a:fld id="{7B943329-1151-9D43-96D9-FAE02A470F34}" type="datetimeFigureOut">
               <a:rPr lang="en-US" smtClean="0"/>
-              <a:t>10/14/2014</a:t>
+              <a:t>10/15/2014</a:t>
             </a:fld>
             <a:endParaRPr lang="en-US"/>
           </a:p>
@@ -1980,7 +1980,7 @@
           <a:p>
             <a:fld id="{7B943329-1151-9D43-96D9-FAE02A470F34}" type="datetimeFigureOut">
               <a:rPr lang="en-US" smtClean="0"/>
-              <a:t>10/14/2014</a:t>
+              <a:t>10/15/2014</a:t>
             </a:fld>
             <a:endParaRPr lang="en-US"/>
           </a:p>
@@ -2102,7 +2102,7 @@
         </p:nvSpPr>
         <p:spPr>
           <a:xfrm>
-            <a:off x="3575050" y="273050"/>
+            <a:off x="3575053" y="273056"/>
             <a:ext cx="5111750" cy="5853113"/>
           </a:xfrm>
         </p:spPr>
@@ -2187,7 +2187,7 @@
         </p:nvSpPr>
         <p:spPr>
           <a:xfrm>
-            <a:off x="457200" y="1435100"/>
+            <a:off x="457200" y="1435103"/>
             <a:ext cx="3008313" cy="4691063"/>
           </a:xfrm>
         </p:spPr>
@@ -2257,7 +2257,7 @@
           <a:p>
             <a:fld id="{7B943329-1151-9D43-96D9-FAE02A470F34}" type="datetimeFigureOut">
               <a:rPr lang="en-US" smtClean="0"/>
-              <a:t>10/14/2014</a:t>
+              <a:t>10/15/2014</a:t>
             </a:fld>
             <a:endParaRPr lang="en-US"/>
           </a:p>
@@ -2510,7 +2510,7 @@
           <a:p>
             <a:fld id="{7B943329-1151-9D43-96D9-FAE02A470F34}" type="datetimeFigureOut">
               <a:rPr lang="en-US" smtClean="0"/>
-              <a:t>10/14/2014</a:t>
+              <a:t>10/15/2014</a:t>
             </a:fld>
             <a:endParaRPr lang="en-US"/>
           </a:p>
@@ -2638,7 +2638,7 @@
         </p:nvSpPr>
         <p:spPr>
           <a:xfrm>
-            <a:off x="457200" y="1600200"/>
+            <a:off x="457200" y="1600206"/>
             <a:ext cx="8229600" cy="4525963"/>
           </a:xfrm>
           <a:prstGeom prst="rect">
@@ -2700,7 +2700,7 @@
         </p:nvSpPr>
         <p:spPr>
           <a:xfrm>
-            <a:off x="457200" y="6356350"/>
+            <a:off x="457200" y="6356356"/>
             <a:ext cx="2133600" cy="365125"/>
           </a:xfrm>
           <a:prstGeom prst="rect">
@@ -2723,7 +2723,7 @@
           <a:p>
             <a:fld id="{7B943329-1151-9D43-96D9-FAE02A470F34}" type="datetimeFigureOut">
               <a:rPr lang="en-US" smtClean="0"/>
-              <a:t>10/14/2014</a:t>
+              <a:t>10/15/2014</a:t>
             </a:fld>
             <a:endParaRPr lang="en-US"/>
           </a:p>
@@ -2741,7 +2741,7 @@
         </p:nvSpPr>
         <p:spPr>
           <a:xfrm>
-            <a:off x="3124200" y="6356350"/>
+            <a:off x="3124200" y="6356356"/>
             <a:ext cx="2895600" cy="365125"/>
           </a:xfrm>
           <a:prstGeom prst="rect">
@@ -2778,7 +2778,7 @@
         </p:nvSpPr>
         <p:spPr>
           <a:xfrm>
-            <a:off x="6553200" y="6356350"/>
+            <a:off x="6553200" y="6356356"/>
             <a:ext cx="2133600" cy="365125"/>
           </a:xfrm>
           <a:prstGeom prst="rect">
@@ -3106,7 +3106,7 @@
         </p:nvSpPr>
         <p:spPr>
           <a:xfrm>
-            <a:off x="2534709" y="772583"/>
+            <a:off x="2534713" y="848782"/>
             <a:ext cx="1031874" cy="539750"/>
           </a:xfrm>
           <a:prstGeom prst="flowChartAlternateProcess">
@@ -3168,7 +3168,7 @@
         </p:nvSpPr>
         <p:spPr>
           <a:xfrm>
-            <a:off x="3566583" y="1581515"/>
+            <a:off x="3566586" y="1581515"/>
             <a:ext cx="1365250" cy="539750"/>
           </a:xfrm>
           <a:prstGeom prst="flowChartAlternateProcess">
@@ -3216,7 +3216,7 @@
         </p:nvSpPr>
         <p:spPr>
           <a:xfrm>
-            <a:off x="2534709" y="2398838"/>
+            <a:off x="2534712" y="2315018"/>
             <a:ext cx="1031874" cy="539750"/>
           </a:xfrm>
           <a:prstGeom prst="flowChartAlternateProcess">
@@ -3289,7 +3289,7 @@
         </p:nvSpPr>
         <p:spPr>
           <a:xfrm>
-            <a:off x="4931833" y="2398838"/>
+            <a:off x="4931833" y="2315018"/>
             <a:ext cx="1031876" cy="539750"/>
           </a:xfrm>
           <a:prstGeom prst="flowChartAlternateProcess">
@@ -3365,8 +3365,8 @@
         </p:nvCxnSpPr>
         <p:spPr>
           <a:xfrm rot="10800000" flipV="1">
-            <a:off x="3050647" y="1851390"/>
-            <a:ext cx="515937" cy="547448"/>
+            <a:off x="3050650" y="1851390"/>
+            <a:ext cx="515937" cy="463628"/>
           </a:xfrm>
           <a:prstGeom prst="curvedConnector2">
             <a:avLst/>
@@ -3401,7 +3401,7 @@
         </p:nvCxnSpPr>
         <p:spPr>
           <a:xfrm>
-            <a:off x="3566583" y="2668713"/>
+            <a:off x="3566583" y="2584893"/>
             <a:ext cx="166687" cy="0"/>
           </a:xfrm>
           <a:prstGeom prst="straightConnector1">
@@ -3437,7 +3437,7 @@
         </p:nvCxnSpPr>
         <p:spPr>
           <a:xfrm>
-            <a:off x="4765146" y="2668713"/>
+            <a:off x="4765149" y="2584893"/>
             <a:ext cx="166687" cy="0"/>
           </a:xfrm>
           <a:prstGeom prst="straightConnector1">
@@ -3473,8 +3473,8 @@
         </p:nvCxnSpPr>
         <p:spPr>
           <a:xfrm rot="16200000" flipV="1">
-            <a:off x="4916078" y="1867145"/>
-            <a:ext cx="547448" cy="515938"/>
+            <a:off x="4957988" y="1825235"/>
+            <a:ext cx="463628" cy="515938"/>
           </a:xfrm>
           <a:prstGeom prst="curvedConnector2">
             <a:avLst/>
@@ -3506,7 +3506,7 @@
         </p:nvSpPr>
         <p:spPr>
           <a:xfrm>
-            <a:off x="3733270" y="2398838"/>
+            <a:off x="3733270" y="2315018"/>
             <a:ext cx="1031876" cy="539750"/>
           </a:xfrm>
           <a:prstGeom prst="flowChartAlternateProcess">
@@ -3567,8 +3567,8 @@
         </p:nvCxnSpPr>
         <p:spPr>
           <a:xfrm>
-            <a:off x="3566583" y="1042458"/>
-            <a:ext cx="682625" cy="539057"/>
+            <a:off x="3566584" y="1118657"/>
+            <a:ext cx="682624" cy="462858"/>
           </a:xfrm>
           <a:prstGeom prst="curvedConnector2">
             <a:avLst/>
@@ -3600,7 +3600,7 @@
         </p:nvSpPr>
         <p:spPr>
           <a:xfrm>
-            <a:off x="4931835" y="772583"/>
+            <a:off x="4931836" y="848783"/>
             <a:ext cx="1031874" cy="539750"/>
           </a:xfrm>
           <a:prstGeom prst="flowChartAlternateProcess">
@@ -3665,8 +3665,8 @@
         </p:nvCxnSpPr>
         <p:spPr>
           <a:xfrm rot="10800000" flipV="1">
-            <a:off x="4249209" y="1042457"/>
-            <a:ext cx="682627" cy="539057"/>
+            <a:off x="4249208" y="1118663"/>
+            <a:ext cx="682628" cy="462857"/>
           </a:xfrm>
           <a:prstGeom prst="curvedConnector2">
             <a:avLst/>
@@ -3700,6 +3700,13 @@
   <p:clrMapOvr>
     <a:masterClrMapping/>
   </p:clrMapOvr>
+  <p:timing>
+    <p:tnLst>
+      <p:par>
+        <p:cTn id="1" dur="indefinite" restart="never" nodeType="tmRoot"/>
+      </p:par>
+    </p:tnLst>
+  </p:timing>
 </p:sld>
 </file>
 
@@ -3728,8 +3735,8 @@
         </p:nvSpPr>
         <p:spPr>
           <a:xfrm>
-            <a:off x="3566583" y="772583"/>
-            <a:ext cx="1365250" cy="539750"/>
+            <a:off x="2386145" y="830094"/>
+            <a:ext cx="917576" cy="539749"/>
           </a:xfrm>
           <a:prstGeom prst="flowChartAlternateProcess">
             <a:avLst/>
@@ -3765,13 +3772,13 @@
           <a:p>
             <a:pPr algn="ctr"/>
             <a:r>
-              <a:rPr lang="en-US" sz="1200" dirty="0" smtClean="0">
+              <a:rPr lang="en-US" sz="1000" dirty="0" smtClean="0">
                 <a:latin typeface="Times New Roman" panose="02020603050405020304" pitchFamily="18" charset="0"/>
                 <a:cs typeface="Times New Roman" panose="02020603050405020304" pitchFamily="18" charset="0"/>
               </a:rPr>
               <a:t>(10ms)</a:t>
             </a:r>
-            <a:endParaRPr lang="en-US" sz="1200" dirty="0">
+            <a:endParaRPr lang="en-US" sz="1000" dirty="0">
               <a:latin typeface="Times New Roman" panose="02020603050405020304" pitchFamily="18" charset="0"/>
               <a:cs typeface="Times New Roman" panose="02020603050405020304" pitchFamily="18" charset="0"/>
             </a:endParaRPr>
@@ -3786,8 +3793,8 @@
         </p:nvSpPr>
         <p:spPr>
           <a:xfrm>
-            <a:off x="3566583" y="1570566"/>
-            <a:ext cx="1365250" cy="539750"/>
+            <a:off x="3462868" y="1570566"/>
+            <a:ext cx="917576" cy="539750"/>
           </a:xfrm>
           <a:prstGeom prst="flowChartAlternateProcess">
             <a:avLst/>
@@ -3834,8 +3841,8 @@
         </p:nvSpPr>
         <p:spPr>
           <a:xfrm>
-            <a:off x="1854995" y="2442633"/>
-            <a:ext cx="1346729" cy="539750"/>
+            <a:off x="2031075" y="2421073"/>
+            <a:ext cx="1627716" cy="539750"/>
           </a:xfrm>
           <a:prstGeom prst="flowChartAlternateProcess">
             <a:avLst/>
@@ -3865,10 +3872,17 @@
                 <a:latin typeface="Times New Roman" panose="02020603050405020304" pitchFamily="18" charset="0"/>
                 <a:cs typeface="Times New Roman" panose="02020603050405020304" pitchFamily="18" charset="0"/>
               </a:rPr>
-              <a:t>Sector Erase </a:t>
-            </a:r>
-            <a:r>
-              <a:rPr lang="en-US" sz="1200" dirty="0" err="1" smtClean="0">
+              <a:t>Subsector </a:t>
+            </a:r>
+            <a:r>
+              <a:rPr lang="en-US" sz="1200" dirty="0" smtClean="0">
+                <a:latin typeface="Times New Roman" panose="02020603050405020304" pitchFamily="18" charset="0"/>
+                <a:cs typeface="Times New Roman" panose="02020603050405020304" pitchFamily="18" charset="0"/>
+              </a:rPr>
+              <a:t>Erase </a:t>
+            </a:r>
+            <a:r>
+              <a:rPr lang="en-US" sz="1200" dirty="0" smtClean="0">
                 <a:latin typeface="Times New Roman" panose="02020603050405020304" pitchFamily="18" charset="0"/>
                 <a:cs typeface="Times New Roman" panose="02020603050405020304" pitchFamily="18" charset="0"/>
               </a:rPr>
@@ -3882,13 +3896,20 @@
           <a:p>
             <a:pPr algn="ctr"/>
             <a:r>
-              <a:rPr lang="en-US" sz="1200" dirty="0" smtClean="0">
-                <a:latin typeface="Times New Roman" panose="02020603050405020304" pitchFamily="18" charset="0"/>
-                <a:cs typeface="Times New Roman" panose="02020603050405020304" pitchFamily="18" charset="0"/>
-              </a:rPr>
-              <a:t>(5us)</a:t>
-            </a:r>
-            <a:endParaRPr lang="en-US" sz="1200" dirty="0">
+              <a:rPr lang="en-US" sz="1000" dirty="0" smtClean="0">
+                <a:latin typeface="Times New Roman" panose="02020603050405020304" pitchFamily="18" charset="0"/>
+                <a:cs typeface="Times New Roman" panose="02020603050405020304" pitchFamily="18" charset="0"/>
+              </a:rPr>
+              <a:t>(4KB, 5us</a:t>
+            </a:r>
+            <a:r>
+              <a:rPr lang="en-US" sz="1000" dirty="0" smtClean="0">
+                <a:latin typeface="Times New Roman" panose="02020603050405020304" pitchFamily="18" charset="0"/>
+                <a:cs typeface="Times New Roman" panose="02020603050405020304" pitchFamily="18" charset="0"/>
+              </a:rPr>
+              <a:t>)</a:t>
+            </a:r>
+            <a:endParaRPr lang="en-US" sz="1000" dirty="0">
               <a:latin typeface="Times New Roman" panose="02020603050405020304" pitchFamily="18" charset="0"/>
               <a:cs typeface="Times New Roman" panose="02020603050405020304" pitchFamily="18" charset="0"/>
             </a:endParaRPr>
@@ -3897,14 +3918,14 @@
       </p:sp>
       <p:sp>
         <p:nvSpPr>
-          <p:cNvPr id="7" name="Alternate Process 6"/>
+          <p:cNvPr id="18" name="Alternate Process 17"/>
           <p:cNvSpPr/>
           <p:nvPr/>
         </p:nvSpPr>
         <p:spPr>
           <a:xfrm>
-            <a:off x="3739621" y="4014258"/>
-            <a:ext cx="1031876" cy="539750"/>
+            <a:off x="2037428" y="3186472"/>
+            <a:ext cx="1627717" cy="539750"/>
           </a:xfrm>
           <a:prstGeom prst="flowChartAlternateProcess">
             <a:avLst/>
@@ -3934,35 +3955,46 @@
                 <a:latin typeface="Times New Roman" panose="02020603050405020304" pitchFamily="18" charset="0"/>
                 <a:cs typeface="Times New Roman" panose="02020603050405020304" pitchFamily="18" charset="0"/>
               </a:rPr>
-              <a:t>Verify</a:t>
-            </a:r>
-            <a:endParaRPr lang="en-US" sz="1200" dirty="0">
+              <a:t>Subsector Erase </a:t>
+            </a:r>
+            <a:r>
+              <a:rPr lang="en-US" sz="1200" dirty="0" smtClean="0">
+                <a:latin typeface="Times New Roman" panose="02020603050405020304" pitchFamily="18" charset="0"/>
+                <a:cs typeface="Times New Roman" panose="02020603050405020304" pitchFamily="18" charset="0"/>
+              </a:rPr>
+              <a:t>Delay</a:t>
+            </a:r>
+          </a:p>
+          <a:p>
+            <a:pPr algn="ctr"/>
+            <a:r>
+              <a:rPr lang="en-US" sz="1000" dirty="0" smtClean="0">
+                <a:latin typeface="Times New Roman" panose="02020603050405020304" pitchFamily="18" charset="0"/>
+                <a:cs typeface="Times New Roman" panose="02020603050405020304" pitchFamily="18" charset="0"/>
+              </a:rPr>
+              <a:t>(150ms)</a:t>
+            </a:r>
+            <a:endParaRPr lang="en-US" sz="1000" dirty="0">
               <a:latin typeface="Times New Roman" panose="02020603050405020304" pitchFamily="18" charset="0"/>
               <a:cs typeface="Times New Roman" panose="02020603050405020304" pitchFamily="18" charset="0"/>
             </a:endParaRPr>
           </a:p>
         </p:txBody>
       </p:sp>
-      <p:cxnSp>
-        <p:nvCxnSpPr>
-          <p:cNvPr id="9" name="Straight Arrow Connector 8"/>
-          <p:cNvCxnSpPr>
-            <a:stCxn id="2" idx="2"/>
-            <a:endCxn id="4" idx="0"/>
-          </p:cNvCxnSpPr>
+      <p:sp>
+        <p:nvSpPr>
+          <p:cNvPr id="21" name="Alternate Process 20"/>
+          <p:cNvSpPr/>
           <p:nvPr/>
-        </p:nvCxnSpPr>
-        <p:spPr>
-          <a:xfrm>
-            <a:off x="4249208" y="1312333"/>
-            <a:ext cx="0" cy="258233"/>
-          </a:xfrm>
-          <a:prstGeom prst="straightConnector1">
+        </p:nvSpPr>
+        <p:spPr>
+          <a:xfrm>
+            <a:off x="4312707" y="3186472"/>
+            <a:ext cx="1365250" cy="539750"/>
+          </a:xfrm>
+          <a:prstGeom prst="flowChartAlternateProcess">
             <a:avLst/>
           </a:prstGeom>
-          <a:ln>
-            <a:tailEnd type="arrow"/>
-          </a:ln>
         </p:spPr>
         <p:style>
           <a:lnRef idx="2">
@@ -3978,17 +4010,52 @@
             <a:schemeClr val="dk1"/>
           </a:fontRef>
         </p:style>
-      </p:cxnSp>
-      <p:sp>
-        <p:nvSpPr>
-          <p:cNvPr id="62" name="Alternate Process 61"/>
+        <p:txBody>
+          <a:bodyPr rtlCol="0" anchor="ctr"/>
+          <a:lstStyle/>
+          <a:p>
+            <a:pPr algn="ctr"/>
+            <a:r>
+              <a:rPr lang="en-US" sz="1200" dirty="0" smtClean="0">
+                <a:latin typeface="Times New Roman" panose="02020603050405020304" pitchFamily="18" charset="0"/>
+                <a:cs typeface="Times New Roman" panose="02020603050405020304" pitchFamily="18" charset="0"/>
+              </a:rPr>
+              <a:t>Page Write</a:t>
+            </a:r>
+          </a:p>
+          <a:p>
+            <a:pPr algn="ctr"/>
+            <a:r>
+              <a:rPr lang="en-US" sz="1000" dirty="0" smtClean="0">
+                <a:latin typeface="Times New Roman" panose="02020603050405020304" pitchFamily="18" charset="0"/>
+                <a:cs typeface="Times New Roman" panose="02020603050405020304" pitchFamily="18" charset="0"/>
+              </a:rPr>
+              <a:t>(256B, ~800us</a:t>
+            </a:r>
+            <a:r>
+              <a:rPr lang="en-US" sz="1000" dirty="0" smtClean="0">
+                <a:latin typeface="Times New Roman" panose="02020603050405020304" pitchFamily="18" charset="0"/>
+                <a:cs typeface="Times New Roman" panose="02020603050405020304" pitchFamily="18" charset="0"/>
+              </a:rPr>
+              <a:t>)</a:t>
+            </a:r>
+            <a:endParaRPr lang="en-US" sz="1000" dirty="0">
+              <a:latin typeface="Times New Roman" panose="02020603050405020304" pitchFamily="18" charset="0"/>
+              <a:cs typeface="Times New Roman" panose="02020603050405020304" pitchFamily="18" charset="0"/>
+            </a:endParaRPr>
+          </a:p>
+        </p:txBody>
+      </p:sp>
+      <p:sp>
+        <p:nvSpPr>
+          <p:cNvPr id="16" name="Alternate Process 17"/>
           <p:cNvSpPr/>
           <p:nvPr/>
         </p:nvSpPr>
         <p:spPr>
           <a:xfrm>
-            <a:off x="3739620" y="2442634"/>
-            <a:ext cx="1031876" cy="539750"/>
+            <a:off x="4321968" y="2402070"/>
+            <a:ext cx="1346728" cy="539750"/>
           </a:xfrm>
           <a:prstGeom prst="flowChartAlternateProcess">
             <a:avLst/>
@@ -4018,35 +4085,46 @@
                 <a:latin typeface="Times New Roman" panose="02020603050405020304" pitchFamily="18" charset="0"/>
                 <a:cs typeface="Times New Roman" panose="02020603050405020304" pitchFamily="18" charset="0"/>
               </a:rPr>
-              <a:t>Read</a:t>
-            </a:r>
-          </a:p>
-          <a:p>
-            <a:pPr algn="ctr"/>
-            <a:r>
-              <a:rPr lang="en-US" sz="1200" dirty="0" smtClean="0">
-                <a:latin typeface="Times New Roman" panose="02020603050405020304" pitchFamily="18" charset="0"/>
-                <a:cs typeface="Times New Roman" panose="02020603050405020304" pitchFamily="18" charset="0"/>
-              </a:rPr>
-              <a:t>(~10ms)</a:t>
-            </a:r>
-            <a:endParaRPr lang="en-US" sz="1200" dirty="0">
+              <a:t>Page Write Delay</a:t>
+            </a:r>
+            <a:endParaRPr lang="en-US" sz="1200" dirty="0" smtClean="0">
               <a:latin typeface="Times New Roman" panose="02020603050405020304" pitchFamily="18" charset="0"/>
               <a:cs typeface="Times New Roman" panose="02020603050405020304" pitchFamily="18" charset="0"/>
             </a:endParaRPr>
           </a:p>
-        </p:txBody>
-      </p:sp>
-      <p:sp>
-        <p:nvSpPr>
-          <p:cNvPr id="18" name="Alternate Process 17"/>
+          <a:p>
+            <a:pPr algn="ctr"/>
+            <a:r>
+              <a:rPr lang="en-US" sz="1000" dirty="0" smtClean="0">
+                <a:latin typeface="Times New Roman" panose="02020603050405020304" pitchFamily="18" charset="0"/>
+                <a:cs typeface="Times New Roman" panose="02020603050405020304" pitchFamily="18" charset="0"/>
+              </a:rPr>
+              <a:t>(5ms</a:t>
+            </a:r>
+            <a:r>
+              <a:rPr lang="en-US" sz="1000" dirty="0" smtClean="0">
+                <a:latin typeface="Times New Roman" panose="02020603050405020304" pitchFamily="18" charset="0"/>
+                <a:cs typeface="Times New Roman" panose="02020603050405020304" pitchFamily="18" charset="0"/>
+              </a:rPr>
+              <a:t>)</a:t>
+            </a:r>
+            <a:endParaRPr lang="en-US" sz="1000" dirty="0">
+              <a:latin typeface="Times New Roman" panose="02020603050405020304" pitchFamily="18" charset="0"/>
+              <a:cs typeface="Times New Roman" panose="02020603050405020304" pitchFamily="18" charset="0"/>
+            </a:endParaRPr>
+          </a:p>
+        </p:txBody>
+      </p:sp>
+      <p:sp>
+        <p:nvSpPr>
+          <p:cNvPr id="17" name="Alternate Process 1"/>
           <p:cNvSpPr/>
           <p:nvPr/>
         </p:nvSpPr>
         <p:spPr>
           <a:xfrm>
-            <a:off x="2018772" y="3213101"/>
-            <a:ext cx="1031876" cy="539750"/>
+            <a:off x="4422244" y="830088"/>
+            <a:ext cx="1255714" cy="539750"/>
           </a:xfrm>
           <a:prstGeom prst="flowChartAlternateProcess">
             <a:avLst/>
@@ -4076,39 +4154,56 @@
                 <a:latin typeface="Times New Roman" panose="02020603050405020304" pitchFamily="18" charset="0"/>
                 <a:cs typeface="Times New Roman" panose="02020603050405020304" pitchFamily="18" charset="0"/>
               </a:rPr>
-              <a:t>Erase Delay</a:t>
-            </a:r>
-          </a:p>
-          <a:p>
-            <a:pPr algn="ctr"/>
-            <a:r>
-              <a:rPr lang="en-US" sz="1200" dirty="0" smtClean="0">
-                <a:latin typeface="Times New Roman" panose="02020603050405020304" pitchFamily="18" charset="0"/>
-                <a:cs typeface="Times New Roman" panose="02020603050405020304" pitchFamily="18" charset="0"/>
-              </a:rPr>
-              <a:t>(150ms)</a:t>
-            </a:r>
-            <a:endParaRPr lang="en-US" sz="1200" dirty="0">
+              <a:t>Release Deep Power-down</a:t>
+            </a:r>
+            <a:endParaRPr lang="en-US" sz="1200" dirty="0" smtClean="0">
               <a:latin typeface="Times New Roman" panose="02020603050405020304" pitchFamily="18" charset="0"/>
               <a:cs typeface="Times New Roman" panose="02020603050405020304" pitchFamily="18" charset="0"/>
             </a:endParaRPr>
           </a:p>
-        </p:txBody>
-      </p:sp>
-      <p:sp>
-        <p:nvSpPr>
-          <p:cNvPr id="21" name="Alternate Process 20"/>
-          <p:cNvSpPr/>
+          <a:p>
+            <a:pPr algn="ctr"/>
+            <a:r>
+              <a:rPr lang="en-US" sz="1000" dirty="0" smtClean="0">
+                <a:latin typeface="Times New Roman" panose="02020603050405020304" pitchFamily="18" charset="0"/>
+                <a:cs typeface="Times New Roman" panose="02020603050405020304" pitchFamily="18" charset="0"/>
+              </a:rPr>
+              <a:t>(~30us</a:t>
+            </a:r>
+            <a:r>
+              <a:rPr lang="en-US" sz="1000" dirty="0" smtClean="0">
+                <a:latin typeface="Times New Roman" panose="02020603050405020304" pitchFamily="18" charset="0"/>
+                <a:cs typeface="Times New Roman" panose="02020603050405020304" pitchFamily="18" charset="0"/>
+              </a:rPr>
+              <a:t>)</a:t>
+            </a:r>
+            <a:endParaRPr lang="en-US" sz="1000" dirty="0">
+              <a:latin typeface="Times New Roman" panose="02020603050405020304" pitchFamily="18" charset="0"/>
+              <a:cs typeface="Times New Roman" panose="02020603050405020304" pitchFamily="18" charset="0"/>
+            </a:endParaRPr>
+          </a:p>
+        </p:txBody>
+      </p:sp>
+      <p:cxnSp>
+        <p:nvCxnSpPr>
+          <p:cNvPr id="19" name="Curved Connector 18"/>
+          <p:cNvCxnSpPr>
+            <a:stCxn id="2" idx="3"/>
+            <a:endCxn id="4" idx="0"/>
+          </p:cNvCxnSpPr>
           <p:nvPr/>
-        </p:nvSpPr>
-        <p:spPr>
-          <a:xfrm>
-            <a:off x="3566584" y="3213101"/>
-            <a:ext cx="1365250" cy="539750"/>
-          </a:xfrm>
-          <a:prstGeom prst="flowChartAlternateProcess">
+        </p:nvCxnSpPr>
+        <p:spPr>
+          <a:xfrm>
+            <a:off x="3303720" y="1099969"/>
+            <a:ext cx="617936" cy="470603"/>
+          </a:xfrm>
+          <a:prstGeom prst="bentConnector2">
             <a:avLst/>
           </a:prstGeom>
+          <a:ln>
+            <a:tailEnd type="arrow"/>
+          </a:ln>
         </p:spPr>
         <p:style>
           <a:lnRef idx="2">
@@ -4124,50 +4219,22 @@
             <a:schemeClr val="dk1"/>
           </a:fontRef>
         </p:style>
-        <p:txBody>
-          <a:bodyPr rtlCol="0" anchor="ctr"/>
-          <a:lstStyle/>
-          <a:p>
-            <a:pPr algn="ctr"/>
-            <a:r>
-              <a:rPr lang="en-US" sz="1200" dirty="0" smtClean="0">
-                <a:latin typeface="Times New Roman" panose="02020603050405020304" pitchFamily="18" charset="0"/>
-                <a:cs typeface="Times New Roman" panose="02020603050405020304" pitchFamily="18" charset="0"/>
-              </a:rPr>
-              <a:t>Page Write</a:t>
-            </a:r>
-          </a:p>
-          <a:p>
-            <a:pPr algn="ctr"/>
-            <a:r>
-              <a:rPr lang="en-US" sz="1200" dirty="0" smtClean="0">
-                <a:latin typeface="Times New Roman" panose="02020603050405020304" pitchFamily="18" charset="0"/>
-                <a:cs typeface="Times New Roman" panose="02020603050405020304" pitchFamily="18" charset="0"/>
-              </a:rPr>
-              <a:t>(5ms)</a:t>
-            </a:r>
-            <a:endParaRPr lang="en-US" sz="1200" dirty="0">
-              <a:latin typeface="Times New Roman" panose="02020603050405020304" pitchFamily="18" charset="0"/>
-              <a:cs typeface="Times New Roman" panose="02020603050405020304" pitchFamily="18" charset="0"/>
-            </a:endParaRPr>
-          </a:p>
-        </p:txBody>
-      </p:sp>
+      </p:cxnSp>
       <p:cxnSp>
         <p:nvCxnSpPr>
-          <p:cNvPr id="35" name="Curved Connector 34"/>
+          <p:cNvPr id="48" name="Straight Arrow Connector 47"/>
           <p:cNvCxnSpPr>
-            <a:stCxn id="4" idx="2"/>
-            <a:endCxn id="62" idx="0"/>
+            <a:stCxn id="4" idx="1"/>
+            <a:endCxn id="138" idx="3"/>
           </p:cNvCxnSpPr>
           <p:nvPr/>
         </p:nvCxnSpPr>
         <p:spPr>
-          <a:xfrm rot="16200000" flipH="1">
-            <a:off x="4086224" y="2273300"/>
-            <a:ext cx="332318" cy="6350"/>
-          </a:xfrm>
-          <a:prstGeom prst="curvedConnector3">
+          <a:xfrm flipH="1">
+            <a:off x="3303722" y="1840441"/>
+            <a:ext cx="159147" cy="0"/>
+          </a:xfrm>
+          <a:prstGeom prst="straightConnector1">
             <a:avLst/>
           </a:prstGeom>
           <a:ln>
@@ -4191,22 +4258,20 @@
       </p:cxnSp>
       <p:cxnSp>
         <p:nvCxnSpPr>
-          <p:cNvPr id="38" name="Curved Connector 37"/>
+          <p:cNvPr id="68" name="Curved Connector 67"/>
           <p:cNvCxnSpPr>
-            <a:stCxn id="62" idx="1"/>
-            <a:endCxn id="5" idx="3"/>
+            <a:stCxn id="17" idx="1"/>
+            <a:endCxn id="4" idx="0"/>
           </p:cNvCxnSpPr>
           <p:nvPr/>
         </p:nvCxnSpPr>
         <p:spPr>
-          <a:xfrm rot="10800000">
-            <a:off x="3201724" y="2712509"/>
-            <a:ext cx="537896" cy="1"/>
-          </a:xfrm>
-          <a:prstGeom prst="curvedConnector3">
-            <a:avLst>
-              <a:gd name="adj1" fmla="val 50000"/>
-            </a:avLst>
+          <a:xfrm rot="10800000" flipV="1">
+            <a:off x="3921657" y="1099968"/>
+            <a:ext cx="500588" cy="470603"/>
+          </a:xfrm>
+          <a:prstGeom prst="bentConnector2">
+            <a:avLst/>
           </a:prstGeom>
           <a:ln>
             <a:tailEnd type="arrow"/>
@@ -4229,22 +4294,20 @@
       </p:cxnSp>
       <p:cxnSp>
         <p:nvCxnSpPr>
-          <p:cNvPr id="70" name="Curved Connector 69"/>
+          <p:cNvPr id="124" name="Straight Arrow Connector 123"/>
           <p:cNvCxnSpPr>
-            <a:stCxn id="7" idx="3"/>
+            <a:stCxn id="136" idx="1"/>
             <a:endCxn id="4" idx="3"/>
           </p:cNvCxnSpPr>
           <p:nvPr/>
         </p:nvCxnSpPr>
         <p:spPr>
-          <a:xfrm flipV="1">
-            <a:off x="4771497" y="1840441"/>
-            <a:ext cx="160336" cy="2443692"/>
-          </a:xfrm>
-          <a:prstGeom prst="curvedConnector3">
-            <a:avLst>
-              <a:gd name="adj1" fmla="val 242576"/>
-            </a:avLst>
+          <a:xfrm flipH="1">
+            <a:off x="4380445" y="1840439"/>
+            <a:ext cx="156103" cy="2"/>
+          </a:xfrm>
+          <a:prstGeom prst="straightConnector1">
+            <a:avLst/>
           </a:prstGeom>
           <a:ln>
             <a:tailEnd type="arrow"/>
@@ -4265,26 +4328,20 @@
           </a:fontRef>
         </p:style>
       </p:cxnSp>
-      <p:cxnSp>
-        <p:nvCxnSpPr>
-          <p:cNvPr id="34" name="Curved Connector 33"/>
-          <p:cNvCxnSpPr>
-            <a:stCxn id="18" idx="2"/>
-            <a:endCxn id="7" idx="1"/>
-          </p:cNvCxnSpPr>
+      <p:sp>
+        <p:nvSpPr>
+          <p:cNvPr id="136" name="Alternate Process 3"/>
+          <p:cNvSpPr/>
           <p:nvPr/>
-        </p:nvCxnSpPr>
-        <p:spPr>
-          <a:xfrm rot="16200000" flipH="1">
-            <a:off x="2871524" y="3416036"/>
-            <a:ext cx="531282" cy="1204911"/>
-          </a:xfrm>
-          <a:prstGeom prst="curvedConnector2">
+        </p:nvSpPr>
+        <p:spPr>
+          <a:xfrm>
+            <a:off x="4536545" y="1570564"/>
+            <a:ext cx="917576" cy="539750"/>
+          </a:xfrm>
+          <a:prstGeom prst="flowChartAlternateProcess">
             <a:avLst/>
           </a:prstGeom>
-          <a:ln>
-            <a:tailEnd type="arrow"/>
-          </a:ln>
         </p:spPr>
         <p:style>
           <a:lnRef idx="2">
@@ -4300,10 +4357,132 @@
             <a:schemeClr val="dk1"/>
           </a:fontRef>
         </p:style>
+        <p:txBody>
+          <a:bodyPr rtlCol="0" anchor="ctr"/>
+          <a:lstStyle/>
+          <a:p>
+            <a:pPr algn="ctr"/>
+            <a:r>
+              <a:rPr lang="en-US" sz="1200" dirty="0" smtClean="0">
+                <a:latin typeface="Times New Roman" panose="02020603050405020304" pitchFamily="18" charset="0"/>
+                <a:cs typeface="Times New Roman" panose="02020603050405020304" pitchFamily="18" charset="0"/>
+              </a:rPr>
+              <a:t>Verify</a:t>
+            </a:r>
+          </a:p>
+          <a:p>
+            <a:pPr algn="ctr"/>
+            <a:r>
+              <a:rPr lang="en-US" sz="1000" dirty="0" smtClean="0">
+                <a:latin typeface="Times New Roman" panose="02020603050405020304" pitchFamily="18" charset="0"/>
+                <a:cs typeface="Times New Roman" panose="02020603050405020304" pitchFamily="18" charset="0"/>
+              </a:rPr>
+              <a:t>(~10ms)</a:t>
+            </a:r>
+            <a:endParaRPr lang="en-US" sz="1000" dirty="0">
+              <a:latin typeface="Times New Roman" panose="02020603050405020304" pitchFamily="18" charset="0"/>
+              <a:cs typeface="Times New Roman" panose="02020603050405020304" pitchFamily="18" charset="0"/>
+            </a:endParaRPr>
+          </a:p>
+        </p:txBody>
+      </p:sp>
+      <p:sp>
+        <p:nvSpPr>
+          <p:cNvPr id="138" name="Alternate Process 3"/>
+          <p:cNvSpPr/>
+          <p:nvPr/>
+        </p:nvSpPr>
+        <p:spPr>
+          <a:xfrm>
+            <a:off x="2386145" y="1570566"/>
+            <a:ext cx="917576" cy="539750"/>
+          </a:xfrm>
+          <a:prstGeom prst="flowChartAlternateProcess">
+            <a:avLst/>
+          </a:prstGeom>
+        </p:spPr>
+        <p:style>
+          <a:lnRef idx="2">
+            <a:schemeClr val="dk1"/>
+          </a:lnRef>
+          <a:fillRef idx="1">
+            <a:schemeClr val="lt1"/>
+          </a:fillRef>
+          <a:effectRef idx="0">
+            <a:schemeClr val="dk1"/>
+          </a:effectRef>
+          <a:fontRef idx="minor">
+            <a:schemeClr val="dk1"/>
+          </a:fontRef>
+        </p:style>
+        <p:txBody>
+          <a:bodyPr rtlCol="0" anchor="ctr"/>
+          <a:lstStyle/>
+          <a:p>
+            <a:pPr algn="ctr"/>
+            <a:r>
+              <a:rPr lang="en-US" sz="1200" dirty="0" smtClean="0">
+                <a:latin typeface="Times New Roman" panose="02020603050405020304" pitchFamily="18" charset="0"/>
+                <a:cs typeface="Times New Roman" panose="02020603050405020304" pitchFamily="18" charset="0"/>
+              </a:rPr>
+              <a:t>Read</a:t>
+            </a:r>
+          </a:p>
+          <a:p>
+            <a:pPr algn="ctr"/>
+            <a:r>
+              <a:rPr lang="en-US" sz="1000" dirty="0" smtClean="0">
+                <a:latin typeface="Times New Roman" panose="02020603050405020304" pitchFamily="18" charset="0"/>
+                <a:cs typeface="Times New Roman" panose="02020603050405020304" pitchFamily="18" charset="0"/>
+              </a:rPr>
+              <a:t>(~10ms)</a:t>
+            </a:r>
+            <a:endParaRPr lang="en-US" sz="1000" dirty="0">
+              <a:latin typeface="Times New Roman" panose="02020603050405020304" pitchFamily="18" charset="0"/>
+              <a:cs typeface="Times New Roman" panose="02020603050405020304" pitchFamily="18" charset="0"/>
+            </a:endParaRPr>
+          </a:p>
+        </p:txBody>
+      </p:sp>
+      <p:cxnSp>
+        <p:nvCxnSpPr>
+          <p:cNvPr id="169" name="Straight Arrow Connector 168"/>
+          <p:cNvCxnSpPr>
+            <a:stCxn id="5" idx="2"/>
+            <a:endCxn id="18" idx="0"/>
+          </p:cNvCxnSpPr>
+          <p:nvPr/>
+        </p:nvCxnSpPr>
+        <p:spPr>
+          <a:xfrm>
+            <a:off x="2844933" y="2960829"/>
+            <a:ext cx="6351" cy="225649"/>
+          </a:xfrm>
+          <a:prstGeom prst="straightConnector1">
+            <a:avLst/>
+          </a:prstGeom>
+          <a:ln>
+            <a:tailEnd type="arrow"/>
+          </a:ln>
+        </p:spPr>
+        <p:style>
+          <a:lnRef idx="2">
+            <a:schemeClr val="dk1"/>
+          </a:lnRef>
+          <a:fillRef idx="1">
+            <a:schemeClr val="lt1"/>
+          </a:fillRef>
+          <a:effectRef idx="0">
+            <a:schemeClr val="dk1"/>
+          </a:effectRef>
+          <a:fontRef idx="minor">
+            <a:schemeClr val="dk1"/>
+          </a:fontRef>
+        </p:style>
       </p:cxnSp>
       <p:cxnSp>
         <p:nvCxnSpPr>
-          <p:cNvPr id="44" name="Straight Arrow Connector 43"/>
+          <p:cNvPr id="173" name="Straight Arrow Connector 172"/>
           <p:cNvCxnSpPr>
             <a:stCxn id="18" idx="3"/>
             <a:endCxn id="21" idx="1"/>
@@ -4312,14 +4491,13 @@
         </p:nvCxnSpPr>
         <p:spPr>
           <a:xfrm>
-            <a:off x="3050648" y="3482976"/>
-            <a:ext cx="515936" cy="0"/>
+            <a:off x="3665145" y="3456347"/>
+            <a:ext cx="647566" cy="0"/>
           </a:xfrm>
           <a:prstGeom prst="straightConnector1">
             <a:avLst/>
           </a:prstGeom>
           <a:ln>
-            <a:headEnd type="arrow"/>
             <a:tailEnd type="arrow"/>
           </a:ln>
         </p:spPr>
@@ -4340,17 +4518,90 @@
       </p:cxnSp>
       <p:cxnSp>
         <p:nvCxnSpPr>
-          <p:cNvPr id="46" name="Straight Arrow Connector 45"/>
+          <p:cNvPr id="178" name="Straight Arrow Connector 177"/>
           <p:cNvCxnSpPr>
-            <a:stCxn id="5" idx="2"/>
-            <a:endCxn id="18" idx="0"/>
+            <a:stCxn id="16" idx="2"/>
+            <a:endCxn id="21" idx="0"/>
           </p:cNvCxnSpPr>
           <p:nvPr/>
         </p:nvCxnSpPr>
         <p:spPr>
           <a:xfrm>
-            <a:off x="2528360" y="2982383"/>
-            <a:ext cx="6350" cy="230718"/>
+            <a:off x="4995332" y="2941820"/>
+            <a:ext cx="0" cy="244652"/>
+          </a:xfrm>
+          <a:prstGeom prst="straightConnector1">
+            <a:avLst/>
+          </a:prstGeom>
+          <a:ln>
+            <a:headEnd type="arrow"/>
+            <a:tailEnd type="arrow"/>
+          </a:ln>
+        </p:spPr>
+        <p:style>
+          <a:lnRef idx="2">
+            <a:schemeClr val="dk1"/>
+          </a:lnRef>
+          <a:fillRef idx="1">
+            <a:schemeClr val="lt1"/>
+          </a:fillRef>
+          <a:effectRef idx="0">
+            <a:schemeClr val="dk1"/>
+          </a:effectRef>
+          <a:fontRef idx="minor">
+            <a:schemeClr val="dk1"/>
+          </a:fontRef>
+        </p:style>
+      </p:cxnSp>
+      <p:cxnSp>
+        <p:nvCxnSpPr>
+          <p:cNvPr id="218" name="Straight Arrow Connector 217"/>
+          <p:cNvCxnSpPr>
+            <a:stCxn id="138" idx="2"/>
+            <a:endCxn id="5" idx="0"/>
+          </p:cNvCxnSpPr>
+          <p:nvPr/>
+        </p:nvCxnSpPr>
+        <p:spPr>
+          <a:xfrm>
+            <a:off x="2844933" y="2110322"/>
+            <a:ext cx="0" cy="310757"/>
+          </a:xfrm>
+          <a:prstGeom prst="straightConnector1">
+            <a:avLst/>
+          </a:prstGeom>
+          <a:ln>
+            <a:tailEnd type="arrow"/>
+          </a:ln>
+        </p:spPr>
+        <p:style>
+          <a:lnRef idx="2">
+            <a:schemeClr val="dk1"/>
+          </a:lnRef>
+          <a:fillRef idx="1">
+            <a:schemeClr val="lt1"/>
+          </a:fillRef>
+          <a:effectRef idx="0">
+            <a:schemeClr val="dk1"/>
+          </a:effectRef>
+          <a:fontRef idx="minor">
+            <a:schemeClr val="dk1"/>
+          </a:fontRef>
+        </p:style>
+      </p:cxnSp>
+      <p:cxnSp>
+        <p:nvCxnSpPr>
+          <p:cNvPr id="219" name="Straight Arrow Connector 218"/>
+          <p:cNvCxnSpPr>
+            <a:stCxn id="16" idx="0"/>
+            <a:endCxn id="136" idx="2"/>
+          </p:cNvCxnSpPr>
+          <p:nvPr/>
+        </p:nvCxnSpPr>
+        <p:spPr>
+          <a:xfrm flipV="1">
+            <a:off x="4995335" y="2110314"/>
+            <a:ext cx="1" cy="291756"/>
           </a:xfrm>
           <a:prstGeom prst="straightConnector1">
             <a:avLst/>
@@ -4419,7 +4670,7 @@
         </p:nvSpPr>
         <p:spPr>
           <a:xfrm>
-            <a:off x="3566583" y="772583"/>
+            <a:off x="2161096" y="787823"/>
             <a:ext cx="1365250" cy="539750"/>
           </a:xfrm>
           <a:prstGeom prst="flowChartAlternateProcess">
@@ -4450,9 +4701,26 @@
                 <a:latin typeface="Times New Roman" panose="02020603050405020304" pitchFamily="18" charset="0"/>
                 <a:cs typeface="Times New Roman" panose="02020603050405020304" pitchFamily="18" charset="0"/>
               </a:rPr>
-              <a:t>Power Up</a:t>
-            </a:r>
-            <a:endParaRPr lang="en-US" sz="1200" dirty="0">
+              <a:t>Power </a:t>
+            </a:r>
+            <a:r>
+              <a:rPr lang="en-US" sz="1200" dirty="0" smtClean="0">
+                <a:latin typeface="Times New Roman" panose="02020603050405020304" pitchFamily="18" charset="0"/>
+                <a:cs typeface="Times New Roman" panose="02020603050405020304" pitchFamily="18" charset="0"/>
+              </a:rPr>
+              <a:t>Up</a:t>
+            </a:r>
+          </a:p>
+          <a:p>
+            <a:pPr algn="ctr"/>
+            <a:r>
+              <a:rPr lang="en-US" sz="1000" dirty="0" smtClean="0">
+                <a:latin typeface="Times New Roman" panose="02020603050405020304" pitchFamily="18" charset="0"/>
+                <a:cs typeface="Times New Roman" panose="02020603050405020304" pitchFamily="18" charset="0"/>
+              </a:rPr>
+              <a:t>(1ms &lt; t &lt; 35ms)</a:t>
+            </a:r>
+            <a:endParaRPr lang="en-US" sz="1000" dirty="0">
               <a:latin typeface="Times New Roman" panose="02020603050405020304" pitchFamily="18" charset="0"/>
               <a:cs typeface="Times New Roman" panose="02020603050405020304" pitchFamily="18" charset="0"/>
             </a:endParaRPr>
@@ -4467,7 +4735,7 @@
         </p:nvSpPr>
         <p:spPr>
           <a:xfrm>
-            <a:off x="3566583" y="1570566"/>
+            <a:off x="2161096" y="1504522"/>
             <a:ext cx="1365250" cy="539750"/>
           </a:xfrm>
           <a:prstGeom prst="flowChartAlternateProcess">
@@ -4500,7 +4768,17 @@
               </a:rPr>
               <a:t>Initialize</a:t>
             </a:r>
-            <a:endParaRPr lang="en-US" sz="1200" dirty="0">
+          </a:p>
+          <a:p>
+            <a:pPr algn="ctr"/>
+            <a:r>
+              <a:rPr lang="en-US" sz="1000" dirty="0" smtClean="0">
+                <a:latin typeface="Times New Roman" panose="02020603050405020304" pitchFamily="18" charset="0"/>
+                <a:cs typeface="Times New Roman" panose="02020603050405020304" pitchFamily="18" charset="0"/>
+              </a:rPr>
+              <a:t>(10ms &lt; t &lt; 1000ms)</a:t>
+            </a:r>
+            <a:endParaRPr lang="en-US" sz="1000" dirty="0">
               <a:latin typeface="Times New Roman" panose="02020603050405020304" pitchFamily="18" charset="0"/>
               <a:cs typeface="Times New Roman" panose="02020603050405020304" pitchFamily="18" charset="0"/>
             </a:endParaRPr>
@@ -4515,8 +4793,8 @@
         </p:nvSpPr>
         <p:spPr>
           <a:xfrm>
-            <a:off x="3810132" y="3218229"/>
-            <a:ext cx="878152" cy="539750"/>
+            <a:off x="3697887" y="3103930"/>
+            <a:ext cx="1115350" cy="539750"/>
           </a:xfrm>
           <a:prstGeom prst="flowChartAlternateProcess">
             <a:avLst/>
@@ -4548,7 +4826,17 @@
               </a:rPr>
               <a:t>Poll</a:t>
             </a:r>
-            <a:endParaRPr lang="en-US" sz="1200" dirty="0">
+          </a:p>
+          <a:p>
+            <a:pPr algn="ctr"/>
+            <a:r>
+              <a:rPr lang="en-US" sz="1000" dirty="0" smtClean="0">
+                <a:latin typeface="Times New Roman" panose="02020603050405020304" pitchFamily="18" charset="0"/>
+                <a:cs typeface="Times New Roman" panose="02020603050405020304" pitchFamily="18" charset="0"/>
+              </a:rPr>
+              <a:t>(0 &lt; t &lt; 250ms)</a:t>
+            </a:r>
+            <a:endParaRPr lang="en-US" sz="1000" dirty="0">
               <a:latin typeface="Times New Roman" panose="02020603050405020304" pitchFamily="18" charset="0"/>
               <a:cs typeface="Times New Roman" panose="02020603050405020304" pitchFamily="18" charset="0"/>
             </a:endParaRPr>
@@ -4566,8 +4854,8 @@
         </p:nvCxnSpPr>
         <p:spPr>
           <a:xfrm>
-            <a:off x="4249208" y="1312333"/>
-            <a:ext cx="0" cy="258233"/>
+            <a:off x="2843719" y="1327579"/>
+            <a:ext cx="0" cy="176949"/>
           </a:xfrm>
           <a:prstGeom prst="straightConnector1">
             <a:avLst/>
@@ -4599,8 +4887,8 @@
         </p:nvSpPr>
         <p:spPr>
           <a:xfrm>
-            <a:off x="3572934" y="2387889"/>
-            <a:ext cx="1365250" cy="539750"/>
+            <a:off x="3914248" y="2387889"/>
+            <a:ext cx="682626" cy="539750"/>
           </a:xfrm>
           <a:prstGeom prst="flowChartAlternateProcess">
             <a:avLst/>
@@ -4647,7 +4935,7 @@
         </p:nvSpPr>
         <p:spPr>
           <a:xfrm>
-            <a:off x="2001074" y="3218229"/>
+            <a:off x="2161096" y="3103929"/>
             <a:ext cx="1365250" cy="539750"/>
           </a:xfrm>
           <a:prstGeom prst="flowChartAlternateProcess">
@@ -4678,35 +4966,39 @@
                 <a:latin typeface="Times New Roman" panose="02020603050405020304" pitchFamily="18" charset="0"/>
                 <a:cs typeface="Times New Roman" panose="02020603050405020304" pitchFamily="18" charset="0"/>
               </a:rPr>
-              <a:t>Command</a:t>
-            </a:r>
-            <a:endParaRPr lang="en-US" sz="1200" dirty="0">
+              <a:t>Write Command</a:t>
+            </a:r>
+          </a:p>
+          <a:p>
+            <a:pPr algn="ctr"/>
+            <a:r>
+              <a:rPr lang="en-US" sz="1000" dirty="0" smtClean="0">
+                <a:latin typeface="Times New Roman" panose="02020603050405020304" pitchFamily="18" charset="0"/>
+                <a:cs typeface="Times New Roman" panose="02020603050405020304" pitchFamily="18" charset="0"/>
+              </a:rPr>
+              <a:t>(~1ms)</a:t>
+            </a:r>
+            <a:endParaRPr lang="en-US" sz="1000" dirty="0">
               <a:latin typeface="Times New Roman" panose="02020603050405020304" pitchFamily="18" charset="0"/>
               <a:cs typeface="Times New Roman" panose="02020603050405020304" pitchFamily="18" charset="0"/>
             </a:endParaRPr>
           </a:p>
         </p:txBody>
       </p:sp>
-      <p:cxnSp>
-        <p:nvCxnSpPr>
-          <p:cNvPr id="31" name="Curved Connector 30"/>
-          <p:cNvCxnSpPr>
-            <a:stCxn id="62" idx="1"/>
-            <a:endCxn id="21" idx="0"/>
-          </p:cNvCxnSpPr>
+      <p:sp>
+        <p:nvSpPr>
+          <p:cNvPr id="12" name="Alternate Process 11"/>
+          <p:cNvSpPr/>
           <p:nvPr/>
-        </p:nvCxnSpPr>
-        <p:spPr>
-          <a:xfrm rot="10800000" flipV="1">
-            <a:off x="2683700" y="2657763"/>
-            <a:ext cx="889235" cy="560465"/>
-          </a:xfrm>
-          <a:prstGeom prst="curvedConnector2">
+        </p:nvSpPr>
+        <p:spPr>
+          <a:xfrm>
+            <a:off x="5046368" y="3103929"/>
+            <a:ext cx="682624" cy="539750"/>
+          </a:xfrm>
+          <a:prstGeom prst="flowChartAlternateProcess">
             <a:avLst/>
           </a:prstGeom>
-          <a:ln>
-            <a:tailEnd type="arrow"/>
-          </a:ln>
         </p:spPr>
         <p:style>
           <a:lnRef idx="2">
@@ -4722,36 +5014,6 @@
             <a:schemeClr val="dk1"/>
           </a:fontRef>
         </p:style>
-      </p:cxnSp>
-      <p:sp>
-        <p:nvSpPr>
-          <p:cNvPr id="12" name="Alternate Process 11"/>
-          <p:cNvSpPr/>
-          <p:nvPr/>
-        </p:nvSpPr>
-        <p:spPr>
-          <a:xfrm>
-            <a:off x="5132092" y="3218229"/>
-            <a:ext cx="1365250" cy="539750"/>
-          </a:xfrm>
-          <a:prstGeom prst="flowChartAlternateProcess">
-            <a:avLst/>
-          </a:prstGeom>
-        </p:spPr>
-        <p:style>
-          <a:lnRef idx="2">
-            <a:schemeClr val="dk1"/>
-          </a:lnRef>
-          <a:fillRef idx="1">
-            <a:schemeClr val="lt1"/>
-          </a:fillRef>
-          <a:effectRef idx="0">
-            <a:schemeClr val="dk1"/>
-          </a:effectRef>
-          <a:fontRef idx="minor">
-            <a:schemeClr val="dk1"/>
-          </a:fontRef>
-        </p:style>
         <p:txBody>
           <a:bodyPr rtlCol="0" anchor="ctr"/>
           <a:lstStyle/>
@@ -4762,9 +5024,19 @@
                 <a:latin typeface="Times New Roman" panose="02020603050405020304" pitchFamily="18" charset="0"/>
                 <a:cs typeface="Times New Roman" panose="02020603050405020304" pitchFamily="18" charset="0"/>
               </a:rPr>
-              <a:t>Completion</a:t>
-            </a:r>
-            <a:endParaRPr lang="en-US" sz="1200" dirty="0">
+              <a:t>Verify</a:t>
+            </a:r>
+          </a:p>
+          <a:p>
+            <a:pPr algn="ctr"/>
+            <a:r>
+              <a:rPr lang="en-US" sz="1000" dirty="0" smtClean="0">
+                <a:latin typeface="Times New Roman" panose="02020603050405020304" pitchFamily="18" charset="0"/>
+                <a:cs typeface="Times New Roman" panose="02020603050405020304" pitchFamily="18" charset="0"/>
+              </a:rPr>
+              <a:t>(~1ms)</a:t>
+            </a:r>
+            <a:endParaRPr lang="en-US" sz="1000" dirty="0">
               <a:latin typeface="Times New Roman" panose="02020603050405020304" pitchFamily="18" charset="0"/>
               <a:cs typeface="Times New Roman" panose="02020603050405020304" pitchFamily="18" charset="0"/>
             </a:endParaRPr>
@@ -4782,46 +5054,10 @@
         </p:nvCxnSpPr>
         <p:spPr>
           <a:xfrm rot="16200000" flipV="1">
-            <a:off x="5096219" y="2499730"/>
-            <a:ext cx="560465" cy="876533"/>
+            <a:off x="4769199" y="2485446"/>
+            <a:ext cx="446165" cy="790807"/>
           </a:xfrm>
           <a:prstGeom prst="curvedConnector2">
-            <a:avLst/>
-          </a:prstGeom>
-          <a:ln>
-            <a:tailEnd type="arrow"/>
-          </a:ln>
-        </p:spPr>
-        <p:style>
-          <a:lnRef idx="2">
-            <a:schemeClr val="dk1"/>
-          </a:lnRef>
-          <a:fillRef idx="1">
-            <a:schemeClr val="lt1"/>
-          </a:fillRef>
-          <a:effectRef idx="0">
-            <a:schemeClr val="dk1"/>
-          </a:effectRef>
-          <a:fontRef idx="minor">
-            <a:schemeClr val="dk1"/>
-          </a:fontRef>
-        </p:style>
-      </p:cxnSp>
-      <p:cxnSp>
-        <p:nvCxnSpPr>
-          <p:cNvPr id="5" name="Straight Arrow Connector 4"/>
-          <p:cNvCxnSpPr>
-            <a:stCxn id="4" idx="2"/>
-            <a:endCxn id="62" idx="0"/>
-          </p:cNvCxnSpPr>
-          <p:nvPr/>
-        </p:nvCxnSpPr>
-        <p:spPr>
-          <a:xfrm>
-            <a:off x="4249208" y="2110316"/>
-            <a:ext cx="6351" cy="277573"/>
-          </a:xfrm>
-          <a:prstGeom prst="straightConnector1">
             <a:avLst/>
           </a:prstGeom>
           <a:ln>
@@ -4854,8 +5090,8 @@
         </p:nvCxnSpPr>
         <p:spPr>
           <a:xfrm>
-            <a:off x="3366324" y="3488104"/>
-            <a:ext cx="443808" cy="0"/>
+            <a:off x="3526347" y="3373810"/>
+            <a:ext cx="171543" cy="1"/>
           </a:xfrm>
           <a:prstGeom prst="straightConnector1">
             <a:avLst/>
@@ -4889,9 +5125,9 @@
           <p:nvPr/>
         </p:nvCxnSpPr>
         <p:spPr>
-          <a:xfrm>
-            <a:off x="4688284" y="3488104"/>
-            <a:ext cx="443808" cy="0"/>
+          <a:xfrm flipV="1">
+            <a:off x="4813240" y="3373810"/>
+            <a:ext cx="233131" cy="1"/>
           </a:xfrm>
           <a:prstGeom prst="straightConnector1">
             <a:avLst/>
@@ -4926,14 +5162,272 @@
         </p:nvCxnSpPr>
         <p:spPr>
           <a:xfrm flipH="1">
-            <a:off x="4249208" y="3488104"/>
-            <a:ext cx="439076" cy="269875"/>
-          </a:xfrm>
-          <a:prstGeom prst="curvedConnector4">
+            <a:off x="4255562" y="3373805"/>
+            <a:ext cx="557676" cy="269875"/>
+          </a:xfrm>
+          <a:prstGeom prst="bentConnector4">
             <a:avLst>
-              <a:gd name="adj1" fmla="val -52064"/>
+              <a:gd name="adj1" fmla="val -13664"/>
               <a:gd name="adj2" fmla="val 184706"/>
             </a:avLst>
+          </a:prstGeom>
+          <a:ln>
+            <a:tailEnd type="arrow"/>
+          </a:ln>
+        </p:spPr>
+        <p:style>
+          <a:lnRef idx="2">
+            <a:schemeClr val="dk1"/>
+          </a:lnRef>
+          <a:fillRef idx="1">
+            <a:schemeClr val="lt1"/>
+          </a:fillRef>
+          <a:effectRef idx="0">
+            <a:schemeClr val="dk1"/>
+          </a:effectRef>
+          <a:fontRef idx="minor">
+            <a:schemeClr val="dk1"/>
+          </a:fontRef>
+        </p:style>
+      </p:cxnSp>
+      <p:cxnSp>
+        <p:nvCxnSpPr>
+          <p:cNvPr id="18" name="Curved Connector 17"/>
+          <p:cNvCxnSpPr>
+            <a:stCxn id="4" idx="2"/>
+            <a:endCxn id="62" idx="0"/>
+          </p:cNvCxnSpPr>
+          <p:nvPr/>
+        </p:nvCxnSpPr>
+        <p:spPr>
+          <a:xfrm rot="16200000" flipH="1">
+            <a:off x="3377835" y="1510159"/>
+            <a:ext cx="343617" cy="1411842"/>
+          </a:xfrm>
+          <a:prstGeom prst="bentConnector3">
+            <a:avLst/>
+          </a:prstGeom>
+          <a:ln>
+            <a:tailEnd type="arrow"/>
+          </a:ln>
+        </p:spPr>
+        <p:style>
+          <a:lnRef idx="2">
+            <a:schemeClr val="dk1"/>
+          </a:lnRef>
+          <a:fillRef idx="1">
+            <a:schemeClr val="lt1"/>
+          </a:fillRef>
+          <a:effectRef idx="0">
+            <a:schemeClr val="dk1"/>
+          </a:effectRef>
+          <a:fontRef idx="minor">
+            <a:schemeClr val="dk1"/>
+          </a:fontRef>
+        </p:style>
+      </p:cxnSp>
+      <p:sp>
+        <p:nvSpPr>
+          <p:cNvPr id="23" name="Alternate Process 3"/>
+          <p:cNvSpPr/>
+          <p:nvPr/>
+        </p:nvSpPr>
+        <p:spPr>
+          <a:xfrm>
+            <a:off x="4363746" y="1504522"/>
+            <a:ext cx="1365250" cy="539750"/>
+          </a:xfrm>
+          <a:prstGeom prst="flowChartAlternateProcess">
+            <a:avLst/>
+          </a:prstGeom>
+        </p:spPr>
+        <p:style>
+          <a:lnRef idx="2">
+            <a:schemeClr val="dk1"/>
+          </a:lnRef>
+          <a:fillRef idx="1">
+            <a:schemeClr val="lt1"/>
+          </a:fillRef>
+          <a:effectRef idx="0">
+            <a:schemeClr val="dk1"/>
+          </a:effectRef>
+          <a:fontRef idx="minor">
+            <a:schemeClr val="dk1"/>
+          </a:fontRef>
+        </p:style>
+        <p:txBody>
+          <a:bodyPr rtlCol="0" anchor="ctr"/>
+          <a:lstStyle/>
+          <a:p>
+            <a:pPr algn="ctr"/>
+            <a:r>
+              <a:rPr lang="en-US" sz="1200" dirty="0" smtClean="0">
+                <a:latin typeface="Times New Roman" panose="02020603050405020304" pitchFamily="18" charset="0"/>
+                <a:cs typeface="Times New Roman" panose="02020603050405020304" pitchFamily="18" charset="0"/>
+              </a:rPr>
+              <a:t>Enter / Exit Power Down</a:t>
+            </a:r>
+            <a:r>
+              <a:rPr lang="en-US" sz="1000" dirty="0" smtClean="0">
+                <a:latin typeface="Times New Roman" panose="02020603050405020304" pitchFamily="18" charset="0"/>
+                <a:cs typeface="Times New Roman" panose="02020603050405020304" pitchFamily="18" charset="0"/>
+              </a:rPr>
+              <a:t>*</a:t>
+            </a:r>
+            <a:endParaRPr lang="en-US" sz="1200" dirty="0" smtClean="0">
+              <a:latin typeface="Times New Roman" panose="02020603050405020304" pitchFamily="18" charset="0"/>
+              <a:cs typeface="Times New Roman" panose="02020603050405020304" pitchFamily="18" charset="0"/>
+            </a:endParaRPr>
+          </a:p>
+        </p:txBody>
+      </p:sp>
+      <p:cxnSp>
+        <p:nvCxnSpPr>
+          <p:cNvPr id="38" name="Straight Arrow Connector 37"/>
+          <p:cNvCxnSpPr>
+            <a:stCxn id="23" idx="2"/>
+            <a:endCxn id="62" idx="0"/>
+          </p:cNvCxnSpPr>
+          <p:nvPr/>
+        </p:nvCxnSpPr>
+        <p:spPr>
+          <a:xfrm rot="5400000">
+            <a:off x="4479160" y="1820680"/>
+            <a:ext cx="343617" cy="790807"/>
+          </a:xfrm>
+          <a:prstGeom prst="bentConnector3">
+            <a:avLst/>
+          </a:prstGeom>
+          <a:ln>
+            <a:headEnd type="arrow"/>
+            <a:tailEnd type="arrow"/>
+          </a:ln>
+        </p:spPr>
+        <p:style>
+          <a:lnRef idx="2">
+            <a:schemeClr val="dk1"/>
+          </a:lnRef>
+          <a:fillRef idx="1">
+            <a:schemeClr val="lt1"/>
+          </a:fillRef>
+          <a:effectRef idx="0">
+            <a:schemeClr val="dk1"/>
+          </a:effectRef>
+          <a:fontRef idx="minor">
+            <a:schemeClr val="dk1"/>
+          </a:fontRef>
+        </p:style>
+      </p:cxnSp>
+      <p:sp>
+        <p:nvSpPr>
+          <p:cNvPr id="41" name="Alternate Process 20"/>
+          <p:cNvSpPr/>
+          <p:nvPr/>
+        </p:nvSpPr>
+        <p:spPr>
+          <a:xfrm>
+            <a:off x="2161096" y="2387889"/>
+            <a:ext cx="1365250" cy="539750"/>
+          </a:xfrm>
+          <a:prstGeom prst="flowChartAlternateProcess">
+            <a:avLst/>
+          </a:prstGeom>
+        </p:spPr>
+        <p:style>
+          <a:lnRef idx="2">
+            <a:schemeClr val="dk1"/>
+          </a:lnRef>
+          <a:fillRef idx="1">
+            <a:schemeClr val="lt1"/>
+          </a:fillRef>
+          <a:effectRef idx="0">
+            <a:schemeClr val="dk1"/>
+          </a:effectRef>
+          <a:fontRef idx="minor">
+            <a:schemeClr val="dk1"/>
+          </a:fontRef>
+        </p:style>
+        <p:txBody>
+          <a:bodyPr rtlCol="0" anchor="ctr"/>
+          <a:lstStyle/>
+          <a:p>
+            <a:pPr algn="ctr"/>
+            <a:r>
+              <a:rPr lang="en-US" sz="1200" dirty="0" smtClean="0">
+                <a:latin typeface="Times New Roman" panose="02020603050405020304" pitchFamily="18" charset="0"/>
+                <a:cs typeface="Times New Roman" panose="02020603050405020304" pitchFamily="18" charset="0"/>
+              </a:rPr>
+              <a:t>Read Cmd / Data</a:t>
+            </a:r>
+          </a:p>
+          <a:p>
+            <a:pPr algn="ctr"/>
+            <a:r>
+              <a:rPr lang="en-US" sz="1000" dirty="0" smtClean="0">
+                <a:latin typeface="Times New Roman" panose="02020603050405020304" pitchFamily="18" charset="0"/>
+                <a:cs typeface="Times New Roman" panose="02020603050405020304" pitchFamily="18" charset="0"/>
+              </a:rPr>
+              <a:t>(~1ms)</a:t>
+            </a:r>
+            <a:endParaRPr lang="en-US" sz="1000" dirty="0">
+              <a:latin typeface="Times New Roman" panose="02020603050405020304" pitchFamily="18" charset="0"/>
+              <a:cs typeface="Times New Roman" panose="02020603050405020304" pitchFamily="18" charset="0"/>
+            </a:endParaRPr>
+          </a:p>
+        </p:txBody>
+      </p:sp>
+      <p:cxnSp>
+        <p:nvCxnSpPr>
+          <p:cNvPr id="42" name="Straight Arrow Connector 41"/>
+          <p:cNvCxnSpPr>
+            <a:stCxn id="41" idx="2"/>
+            <a:endCxn id="21" idx="0"/>
+          </p:cNvCxnSpPr>
+          <p:nvPr/>
+        </p:nvCxnSpPr>
+        <p:spPr>
+          <a:xfrm>
+            <a:off x="2843719" y="2927639"/>
+            <a:ext cx="0" cy="176290"/>
+          </a:xfrm>
+          <a:prstGeom prst="straightConnector1">
+            <a:avLst/>
+          </a:prstGeom>
+          <a:ln>
+            <a:tailEnd type="arrow"/>
+          </a:ln>
+        </p:spPr>
+        <p:style>
+          <a:lnRef idx="2">
+            <a:schemeClr val="dk1"/>
+          </a:lnRef>
+          <a:fillRef idx="1">
+            <a:schemeClr val="lt1"/>
+          </a:fillRef>
+          <a:effectRef idx="0">
+            <a:schemeClr val="dk1"/>
+          </a:effectRef>
+          <a:fontRef idx="minor">
+            <a:schemeClr val="dk1"/>
+          </a:fontRef>
+        </p:style>
+      </p:cxnSp>
+      <p:cxnSp>
+        <p:nvCxnSpPr>
+          <p:cNvPr id="45" name="Straight Arrow Connector 44"/>
+          <p:cNvCxnSpPr>
+            <a:stCxn id="62" idx="1"/>
+            <a:endCxn id="41" idx="3"/>
+          </p:cNvCxnSpPr>
+          <p:nvPr/>
+        </p:nvCxnSpPr>
+        <p:spPr>
+          <a:xfrm flipH="1">
+            <a:off x="3526344" y="2657764"/>
+            <a:ext cx="387904" cy="0"/>
+          </a:xfrm>
+          <a:prstGeom prst="straightConnector1">
+            <a:avLst/>
           </a:prstGeom>
           <a:ln>
             <a:tailEnd type="arrow"/>
@@ -4999,7 +5493,7 @@
         </p:nvSpPr>
         <p:spPr>
           <a:xfrm>
-            <a:off x="3566583" y="772583"/>
+            <a:off x="3620559" y="1472430"/>
             <a:ext cx="1365250" cy="539750"/>
           </a:xfrm>
           <a:prstGeom prst="flowChartAlternateProcess">
@@ -5030,9 +5524,26 @@
                 <a:latin typeface="Times New Roman" panose="02020603050405020304" pitchFamily="18" charset="0"/>
                 <a:cs typeface="Times New Roman" panose="02020603050405020304" pitchFamily="18" charset="0"/>
               </a:rPr>
-              <a:t>Power Up</a:t>
-            </a:r>
-            <a:endParaRPr lang="en-US" sz="1200" dirty="0">
+              <a:t>Power </a:t>
+            </a:r>
+            <a:r>
+              <a:rPr lang="en-US" sz="1200" dirty="0" smtClean="0">
+                <a:latin typeface="Times New Roman" panose="02020603050405020304" pitchFamily="18" charset="0"/>
+                <a:cs typeface="Times New Roman" panose="02020603050405020304" pitchFamily="18" charset="0"/>
+              </a:rPr>
+              <a:t>Up</a:t>
+            </a:r>
+          </a:p>
+          <a:p>
+            <a:pPr algn="ctr"/>
+            <a:r>
+              <a:rPr lang="en-US" sz="1000" dirty="0" smtClean="0">
+                <a:latin typeface="Times New Roman" panose="02020603050405020304" pitchFamily="18" charset="0"/>
+                <a:cs typeface="Times New Roman" panose="02020603050405020304" pitchFamily="18" charset="0"/>
+              </a:rPr>
+              <a:t>(60ms)</a:t>
+            </a:r>
+            <a:endParaRPr lang="en-US" sz="1000" dirty="0">
               <a:latin typeface="Times New Roman" panose="02020603050405020304" pitchFamily="18" charset="0"/>
               <a:cs typeface="Times New Roman" panose="02020603050405020304" pitchFamily="18" charset="0"/>
             </a:endParaRPr>
@@ -5047,8 +5558,8 @@
         </p:nvSpPr>
         <p:spPr>
           <a:xfrm>
-            <a:off x="3566583" y="1570566"/>
-            <a:ext cx="1365250" cy="539750"/>
+            <a:off x="3620561" y="2172278"/>
+            <a:ext cx="1365249" cy="539750"/>
           </a:xfrm>
           <a:prstGeom prst="flowChartAlternateProcess">
             <a:avLst/>
@@ -5074,61 +5585,13 @@
           <a:p>
             <a:pPr algn="ctr"/>
             <a:r>
-              <a:rPr lang="en-US" sz="1200" dirty="0" smtClean="0">
-                <a:latin typeface="Times New Roman" panose="02020603050405020304" pitchFamily="18" charset="0"/>
-                <a:cs typeface="Times New Roman" panose="02020603050405020304" pitchFamily="18" charset="0"/>
-              </a:rPr>
-              <a:t>Idle</a:t>
-            </a:r>
-            <a:endParaRPr lang="en-US" sz="1200" dirty="0">
-              <a:latin typeface="Times New Roman" panose="02020603050405020304" pitchFamily="18" charset="0"/>
-              <a:cs typeface="Times New Roman" panose="02020603050405020304" pitchFamily="18" charset="0"/>
-            </a:endParaRPr>
-          </a:p>
-        </p:txBody>
-      </p:sp>
-      <p:sp>
-        <p:nvSpPr>
-          <p:cNvPr id="7" name="Alternate Process 6"/>
-          <p:cNvSpPr/>
-          <p:nvPr/>
-        </p:nvSpPr>
-        <p:spPr>
-          <a:xfrm>
-            <a:off x="5127496" y="2394918"/>
-            <a:ext cx="1365250" cy="539750"/>
-          </a:xfrm>
-          <a:prstGeom prst="flowChartAlternateProcess">
-            <a:avLst/>
-          </a:prstGeom>
-        </p:spPr>
-        <p:style>
-          <a:lnRef idx="2">
-            <a:schemeClr val="dk1"/>
-          </a:lnRef>
-          <a:fillRef idx="1">
-            <a:schemeClr val="lt1"/>
-          </a:fillRef>
-          <a:effectRef idx="0">
-            <a:schemeClr val="dk1"/>
-          </a:effectRef>
-          <a:fontRef idx="minor">
-            <a:schemeClr val="dk1"/>
-          </a:fontRef>
-        </p:style>
-        <p:txBody>
-          <a:bodyPr rtlCol="0" anchor="ctr"/>
-          <a:lstStyle/>
-          <a:p>
-            <a:pPr algn="ctr"/>
-            <a:r>
-              <a:rPr lang="en-US" sz="1200" dirty="0" smtClean="0">
-                <a:latin typeface="Times New Roman" panose="02020603050405020304" pitchFamily="18" charset="0"/>
-                <a:cs typeface="Times New Roman" panose="02020603050405020304" pitchFamily="18" charset="0"/>
-              </a:rPr>
-              <a:t>Read</a:t>
-            </a:r>
-            <a:endParaRPr lang="en-US" sz="1200" dirty="0">
+              <a:rPr lang="en-US" sz="1100" dirty="0" smtClean="0">
+                <a:latin typeface="Times New Roman" panose="02020603050405020304" pitchFamily="18" charset="0"/>
+                <a:cs typeface="Times New Roman" panose="02020603050405020304" pitchFamily="18" charset="0"/>
+              </a:rPr>
+              <a:t>Idle / Stale / Active</a:t>
+            </a:r>
+            <a:endParaRPr lang="en-US" sz="1100" dirty="0">
               <a:latin typeface="Times New Roman" panose="02020603050405020304" pitchFamily="18" charset="0"/>
               <a:cs typeface="Times New Roman" panose="02020603050405020304" pitchFamily="18" charset="0"/>
             </a:endParaRPr>
@@ -5146,8 +5609,8 @@
         </p:nvCxnSpPr>
         <p:spPr>
           <a:xfrm>
-            <a:off x="4249208" y="1312333"/>
-            <a:ext cx="0" cy="258233"/>
+            <a:off x="4303184" y="2012180"/>
+            <a:ext cx="0" cy="160098"/>
           </a:xfrm>
           <a:prstGeom prst="straightConnector1">
             <a:avLst/>
@@ -5179,7 +5642,7 @@
         </p:nvSpPr>
         <p:spPr>
           <a:xfrm>
-            <a:off x="2040268" y="2387889"/>
+            <a:off x="2074336" y="2172278"/>
             <a:ext cx="1365250" cy="539750"/>
           </a:xfrm>
           <a:prstGeom prst="flowChartAlternateProcess">
@@ -5210,9 +5673,19 @@
                 <a:latin typeface="Times New Roman" panose="02020603050405020304" pitchFamily="18" charset="0"/>
                 <a:cs typeface="Times New Roman" panose="02020603050405020304" pitchFamily="18" charset="0"/>
               </a:rPr>
-              <a:t>Command</a:t>
-            </a:r>
-            <a:endParaRPr lang="en-US" sz="1200" dirty="0">
+              <a:t>Measure Command</a:t>
+            </a:r>
+          </a:p>
+          <a:p>
+            <a:pPr algn="ctr"/>
+            <a:r>
+              <a:rPr lang="en-US" sz="1000" dirty="0" smtClean="0">
+                <a:latin typeface="Times New Roman" panose="02020603050405020304" pitchFamily="18" charset="0"/>
+                <a:cs typeface="Times New Roman" panose="02020603050405020304" pitchFamily="18" charset="0"/>
+              </a:rPr>
+              <a:t>(0.1ms &lt; t &lt; 4ms)</a:t>
+            </a:r>
+            <a:endParaRPr lang="en-US" sz="1000" dirty="0">
               <a:latin typeface="Times New Roman" panose="02020603050405020304" pitchFamily="18" charset="0"/>
               <a:cs typeface="Times New Roman" panose="02020603050405020304" pitchFamily="18" charset="0"/>
             </a:endParaRPr>
@@ -5227,7 +5700,7 @@
         </p:nvSpPr>
         <p:spPr>
           <a:xfrm>
-            <a:off x="3572934" y="2387889"/>
+            <a:off x="2074336" y="2877128"/>
             <a:ext cx="1365250" cy="539750"/>
           </a:xfrm>
           <a:prstGeom prst="flowChartAlternateProcess">
@@ -5258,37 +5731,39 @@
                 <a:latin typeface="Times New Roman" panose="02020603050405020304" pitchFamily="18" charset="0"/>
                 <a:cs typeface="Times New Roman" panose="02020603050405020304" pitchFamily="18" charset="0"/>
               </a:rPr>
-              <a:t>Wait</a:t>
-            </a:r>
-            <a:endParaRPr lang="en-US" sz="1200" dirty="0">
+              <a:t>Temperature Conversion</a:t>
+            </a:r>
+          </a:p>
+          <a:p>
+            <a:pPr algn="ctr"/>
+            <a:r>
+              <a:rPr lang="en-US" sz="1000" dirty="0" smtClean="0">
+                <a:latin typeface="Times New Roman" panose="02020603050405020304" pitchFamily="18" charset="0"/>
+                <a:cs typeface="Times New Roman" panose="02020603050405020304" pitchFamily="18" charset="0"/>
+              </a:rPr>
+              <a:t>(~20ms)</a:t>
+            </a:r>
+            <a:endParaRPr lang="en-US" sz="1000" dirty="0">
               <a:latin typeface="Times New Roman" panose="02020603050405020304" pitchFamily="18" charset="0"/>
               <a:cs typeface="Times New Roman" panose="02020603050405020304" pitchFamily="18" charset="0"/>
             </a:endParaRPr>
           </a:p>
         </p:txBody>
       </p:sp>
-      <p:cxnSp>
-        <p:nvCxnSpPr>
-          <p:cNvPr id="39" name="Curved Connector 38"/>
-          <p:cNvCxnSpPr>
-            <a:stCxn id="62" idx="3"/>
-            <a:endCxn id="21" idx="1"/>
-          </p:cNvCxnSpPr>
+      <p:sp>
+        <p:nvSpPr>
+          <p:cNvPr id="22" name="Alternate Process 3"/>
+          <p:cNvSpPr/>
           <p:nvPr/>
-        </p:nvCxnSpPr>
-        <p:spPr>
-          <a:xfrm>
-            <a:off x="3405518" y="2657764"/>
-            <a:ext cx="167416" cy="12700"/>
-          </a:xfrm>
-          <a:prstGeom prst="curvedConnector3">
-            <a:avLst>
-              <a:gd name="adj1" fmla="val 50000"/>
-            </a:avLst>
-          </a:prstGeom>
-          <a:ln>
-            <a:tailEnd type="arrow"/>
-          </a:ln>
+        </p:nvSpPr>
+        <p:spPr>
+          <a:xfrm>
+            <a:off x="5163912" y="2877128"/>
+            <a:ext cx="1043333" cy="539750"/>
+          </a:xfrm>
+          <a:prstGeom prst="flowChartAlternateProcess">
+            <a:avLst/>
+          </a:prstGeom>
         </p:spPr>
         <p:style>
           <a:lnRef idx="2">
@@ -5304,29 +5779,56 @@
             <a:schemeClr val="dk1"/>
           </a:fontRef>
         </p:style>
-      </p:cxnSp>
-      <p:cxnSp>
-        <p:nvCxnSpPr>
-          <p:cNvPr id="42" name="Curved Connector 41"/>
-          <p:cNvCxnSpPr>
-            <a:stCxn id="21" idx="3"/>
-            <a:endCxn id="7" idx="1"/>
-          </p:cNvCxnSpPr>
+        <p:txBody>
+          <a:bodyPr rtlCol="0" anchor="ctr"/>
+          <a:lstStyle/>
+          <a:p>
+            <a:pPr algn="ctr"/>
+            <a:r>
+              <a:rPr lang="en-US" sz="1200" dirty="0" smtClean="0">
+                <a:latin typeface="Times New Roman" panose="02020603050405020304" pitchFamily="18" charset="0"/>
+                <a:cs typeface="Times New Roman" panose="02020603050405020304" pitchFamily="18" charset="0"/>
+              </a:rPr>
+              <a:t>Sleep</a:t>
+            </a:r>
+          </a:p>
+          <a:p>
+            <a:pPr algn="ctr"/>
+            <a:r>
+              <a:rPr lang="en-US" sz="1200" dirty="0" smtClean="0">
+                <a:latin typeface="Times New Roman" panose="02020603050405020304" pitchFamily="18" charset="0"/>
+                <a:cs typeface="Times New Roman" panose="02020603050405020304" pitchFamily="18" charset="0"/>
+              </a:rPr>
+              <a:t>Data </a:t>
+            </a:r>
+            <a:r>
+              <a:rPr lang="en-US" sz="1200" dirty="0" smtClean="0">
+                <a:latin typeface="Times New Roman" panose="02020603050405020304" pitchFamily="18" charset="0"/>
+                <a:cs typeface="Times New Roman" panose="02020603050405020304" pitchFamily="18" charset="0"/>
+              </a:rPr>
+              <a:t>Ready</a:t>
+            </a:r>
+            <a:endParaRPr lang="en-US" sz="1200" dirty="0">
+              <a:latin typeface="Times New Roman" panose="02020603050405020304" pitchFamily="18" charset="0"/>
+              <a:cs typeface="Times New Roman" panose="02020603050405020304" pitchFamily="18" charset="0"/>
+            </a:endParaRPr>
+          </a:p>
+        </p:txBody>
+      </p:sp>
+      <p:sp>
+        <p:nvSpPr>
+          <p:cNvPr id="51" name="Alternate Process 61"/>
+          <p:cNvSpPr/>
           <p:nvPr/>
-        </p:nvCxnSpPr>
-        <p:spPr>
-          <a:xfrm>
-            <a:off x="4938184" y="2657764"/>
-            <a:ext cx="189312" cy="7029"/>
-          </a:xfrm>
-          <a:prstGeom prst="curvedConnector3">
-            <a:avLst>
-              <a:gd name="adj1" fmla="val 50000"/>
-            </a:avLst>
-          </a:prstGeom>
-          <a:ln>
-            <a:tailEnd type="arrow"/>
-          </a:ln>
+        </p:nvSpPr>
+        <p:spPr>
+          <a:xfrm>
+            <a:off x="5163911" y="2172278"/>
+            <a:ext cx="1043333" cy="539750"/>
+          </a:xfrm>
+          <a:prstGeom prst="flowChartAlternateProcess">
+            <a:avLst/>
+          </a:prstGeom>
         </p:spPr>
         <p:style>
           <a:lnRef idx="2">
@@ -5342,22 +5844,65 @@
             <a:schemeClr val="dk1"/>
           </a:fontRef>
         </p:style>
-      </p:cxnSp>
+        <p:txBody>
+          <a:bodyPr rtlCol="0" anchor="ctr"/>
+          <a:lstStyle/>
+          <a:p>
+            <a:pPr algn="ctr"/>
+            <a:r>
+              <a:rPr lang="en-US" sz="1200" dirty="0" smtClean="0">
+                <a:latin typeface="Times New Roman" panose="02020603050405020304" pitchFamily="18" charset="0"/>
+                <a:cs typeface="Times New Roman" panose="02020603050405020304" pitchFamily="18" charset="0"/>
+              </a:rPr>
+              <a:t>Read Command</a:t>
+            </a:r>
+          </a:p>
+          <a:p>
+            <a:pPr algn="ctr"/>
+            <a:r>
+              <a:rPr lang="en-US" sz="1200" dirty="0" smtClean="0">
+                <a:latin typeface="Times New Roman" panose="02020603050405020304" pitchFamily="18" charset="0"/>
+                <a:cs typeface="Times New Roman" panose="02020603050405020304" pitchFamily="18" charset="0"/>
+              </a:rPr>
+              <a:t>(</a:t>
+            </a:r>
+            <a:r>
+              <a:rPr lang="en-US" sz="1200" dirty="0" smtClean="0">
+                <a:latin typeface="Times New Roman" panose="02020603050405020304" pitchFamily="18" charset="0"/>
+                <a:cs typeface="Times New Roman" panose="02020603050405020304" pitchFamily="18" charset="0"/>
+                <a:sym typeface="Wingdings" panose="05000000000000000000" pitchFamily="2" charset="2"/>
+              </a:rPr>
+              <a:t>~2ms</a:t>
+            </a:r>
+            <a:r>
+              <a:rPr lang="en-US" sz="1200" dirty="0" smtClean="0">
+                <a:latin typeface="Times New Roman" panose="02020603050405020304" pitchFamily="18" charset="0"/>
+                <a:cs typeface="Times New Roman" panose="02020603050405020304" pitchFamily="18" charset="0"/>
+              </a:rPr>
+              <a:t>)</a:t>
+            </a:r>
+            <a:endParaRPr lang="en-US" sz="1200" dirty="0">
+              <a:latin typeface="Times New Roman" panose="02020603050405020304" pitchFamily="18" charset="0"/>
+              <a:cs typeface="Times New Roman" panose="02020603050405020304" pitchFamily="18" charset="0"/>
+            </a:endParaRPr>
+          </a:p>
+        </p:txBody>
+      </p:sp>
       <p:cxnSp>
         <p:nvCxnSpPr>
-          <p:cNvPr id="45" name="Curved Connector 44"/>
+          <p:cNvPr id="55" name="Straight Arrow Connector 54"/>
           <p:cNvCxnSpPr>
-            <a:stCxn id="4" idx="1"/>
-            <a:endCxn id="62" idx="0"/>
+            <a:stCxn id="21" idx="3"/>
+            <a:endCxn id="65" idx="1"/>
           </p:cNvCxnSpPr>
           <p:nvPr/>
         </p:nvCxnSpPr>
         <p:spPr>
-          <a:xfrm rot="10800000" flipV="1">
-            <a:off x="2722893" y="1840441"/>
-            <a:ext cx="843690" cy="547448"/>
-          </a:xfrm>
-          <a:prstGeom prst="curvedConnector2">
+          <a:xfrm>
+            <a:off x="3439583" y="3147003"/>
+            <a:ext cx="180976" cy="0"/>
+          </a:xfrm>
+          <a:prstGeom prst="straightConnector1">
             <a:avLst/>
           </a:prstGeom>
           <a:ln>
@@ -5381,20 +5926,261 @@
       </p:cxnSp>
       <p:cxnSp>
         <p:nvCxnSpPr>
-          <p:cNvPr id="48" name="Curved Connector 47"/>
+          <p:cNvPr id="58" name="Straight Arrow Connector 57"/>
           <p:cNvCxnSpPr>
-            <a:stCxn id="7" idx="0"/>
+            <a:stCxn id="65" idx="3"/>
+            <a:endCxn id="22" idx="1"/>
+          </p:cNvCxnSpPr>
+          <p:nvPr/>
+        </p:nvCxnSpPr>
+        <p:spPr>
+          <a:xfrm>
+            <a:off x="4985808" y="3147003"/>
+            <a:ext cx="178104" cy="0"/>
+          </a:xfrm>
+          <a:prstGeom prst="straightConnector1">
+            <a:avLst/>
+          </a:prstGeom>
+          <a:ln>
+            <a:tailEnd type="arrow"/>
+          </a:ln>
+        </p:spPr>
+        <p:style>
+          <a:lnRef idx="2">
+            <a:schemeClr val="dk1"/>
+          </a:lnRef>
+          <a:fillRef idx="1">
+            <a:schemeClr val="lt1"/>
+          </a:fillRef>
+          <a:effectRef idx="0">
+            <a:schemeClr val="dk1"/>
+          </a:effectRef>
+          <a:fontRef idx="minor">
+            <a:schemeClr val="dk1"/>
+          </a:fontRef>
+        </p:style>
+      </p:cxnSp>
+      <p:sp>
+        <p:nvSpPr>
+          <p:cNvPr id="65" name="Alternate Process 3"/>
+          <p:cNvSpPr/>
+          <p:nvPr/>
+        </p:nvSpPr>
+        <p:spPr>
+          <a:xfrm>
+            <a:off x="3620561" y="2877128"/>
+            <a:ext cx="1365249" cy="539750"/>
+          </a:xfrm>
+          <a:prstGeom prst="flowChartAlternateProcess">
+            <a:avLst/>
+          </a:prstGeom>
+        </p:spPr>
+        <p:style>
+          <a:lnRef idx="2">
+            <a:schemeClr val="dk1"/>
+          </a:lnRef>
+          <a:fillRef idx="1">
+            <a:schemeClr val="lt1"/>
+          </a:fillRef>
+          <a:effectRef idx="0">
+            <a:schemeClr val="dk1"/>
+          </a:effectRef>
+          <a:fontRef idx="minor">
+            <a:schemeClr val="dk1"/>
+          </a:fontRef>
+        </p:style>
+        <p:txBody>
+          <a:bodyPr rtlCol="0" anchor="ctr"/>
+          <a:lstStyle/>
+          <a:p>
+            <a:pPr algn="ctr"/>
+            <a:r>
+              <a:rPr lang="en-US" sz="1200" dirty="0" smtClean="0">
+                <a:latin typeface="Times New Roman" panose="02020603050405020304" pitchFamily="18" charset="0"/>
+                <a:cs typeface="Times New Roman" panose="02020603050405020304" pitchFamily="18" charset="0"/>
+              </a:rPr>
+              <a:t>Humidity Conversion</a:t>
+            </a:r>
+          </a:p>
+          <a:p>
+            <a:pPr algn="ctr"/>
+            <a:r>
+              <a:rPr lang="en-US" sz="1000" dirty="0" smtClean="0">
+                <a:latin typeface="Times New Roman" panose="02020603050405020304" pitchFamily="18" charset="0"/>
+                <a:cs typeface="Times New Roman" panose="02020603050405020304" pitchFamily="18" charset="0"/>
+              </a:rPr>
+              <a:t>(~20ms)</a:t>
+            </a:r>
+            <a:endParaRPr lang="en-US" sz="1000" dirty="0">
+              <a:latin typeface="Times New Roman" panose="02020603050405020304" pitchFamily="18" charset="0"/>
+              <a:cs typeface="Times New Roman" panose="02020603050405020304" pitchFamily="18" charset="0"/>
+            </a:endParaRPr>
+          </a:p>
+        </p:txBody>
+      </p:sp>
+      <p:cxnSp>
+        <p:nvCxnSpPr>
+          <p:cNvPr id="70" name="Straight Arrow Connector 69"/>
+          <p:cNvCxnSpPr>
+            <a:stCxn id="62" idx="2"/>
+            <a:endCxn id="21" idx="0"/>
+          </p:cNvCxnSpPr>
+          <p:nvPr/>
+        </p:nvCxnSpPr>
+        <p:spPr>
+          <a:xfrm>
+            <a:off x="2756958" y="2712028"/>
+            <a:ext cx="0" cy="165100"/>
+          </a:xfrm>
+          <a:prstGeom prst="straightConnector1">
+            <a:avLst/>
+          </a:prstGeom>
+          <a:ln>
+            <a:tailEnd type="arrow"/>
+          </a:ln>
+        </p:spPr>
+        <p:style>
+          <a:lnRef idx="2">
+            <a:schemeClr val="dk1"/>
+          </a:lnRef>
+          <a:fillRef idx="1">
+            <a:schemeClr val="lt1"/>
+          </a:fillRef>
+          <a:effectRef idx="0">
+            <a:schemeClr val="dk1"/>
+          </a:effectRef>
+          <a:fontRef idx="minor">
+            <a:schemeClr val="dk1"/>
+          </a:fontRef>
+        </p:style>
+      </p:cxnSp>
+      <p:cxnSp>
+        <p:nvCxnSpPr>
+          <p:cNvPr id="73" name="Straight Arrow Connector 72"/>
+          <p:cNvCxnSpPr>
+            <a:stCxn id="22" idx="0"/>
+            <a:endCxn id="51" idx="2"/>
+          </p:cNvCxnSpPr>
+          <p:nvPr/>
+        </p:nvCxnSpPr>
+        <p:spPr>
+          <a:xfrm flipH="1" flipV="1">
+            <a:off x="5685582" y="2712028"/>
+            <a:ext cx="1" cy="165100"/>
+          </a:xfrm>
+          <a:prstGeom prst="straightConnector1">
+            <a:avLst/>
+          </a:prstGeom>
+          <a:ln>
+            <a:tailEnd type="arrow"/>
+          </a:ln>
+        </p:spPr>
+        <p:style>
+          <a:lnRef idx="2">
+            <a:schemeClr val="dk1"/>
+          </a:lnRef>
+          <a:fillRef idx="1">
+            <a:schemeClr val="lt1"/>
+          </a:fillRef>
+          <a:effectRef idx="0">
+            <a:schemeClr val="dk1"/>
+          </a:effectRef>
+          <a:fontRef idx="minor">
+            <a:schemeClr val="dk1"/>
+          </a:fontRef>
+        </p:style>
+      </p:cxnSp>
+      <p:cxnSp>
+        <p:nvCxnSpPr>
+          <p:cNvPr id="123" name="Straight Arrow Connector 122"/>
+          <p:cNvCxnSpPr>
+            <a:stCxn id="4" idx="1"/>
+            <a:endCxn id="62" idx="3"/>
+          </p:cNvCxnSpPr>
+          <p:nvPr/>
+        </p:nvCxnSpPr>
+        <p:spPr>
+          <a:xfrm flipH="1">
+            <a:off x="3439583" y="2442153"/>
+            <a:ext cx="180976" cy="0"/>
+          </a:xfrm>
+          <a:prstGeom prst="straightConnector1">
+            <a:avLst/>
+          </a:prstGeom>
+          <a:ln>
+            <a:tailEnd type="arrow"/>
+          </a:ln>
+        </p:spPr>
+        <p:style>
+          <a:lnRef idx="2">
+            <a:schemeClr val="dk1"/>
+          </a:lnRef>
+          <a:fillRef idx="1">
+            <a:schemeClr val="lt1"/>
+          </a:fillRef>
+          <a:effectRef idx="0">
+            <a:schemeClr val="dk1"/>
+          </a:effectRef>
+          <a:fontRef idx="minor">
+            <a:schemeClr val="dk1"/>
+          </a:fontRef>
+        </p:style>
+      </p:cxnSp>
+      <p:cxnSp>
+        <p:nvCxnSpPr>
+          <p:cNvPr id="126" name="Straight Arrow Connector 125"/>
+          <p:cNvCxnSpPr>
+            <a:stCxn id="51" idx="1"/>
             <a:endCxn id="4" idx="3"/>
           </p:cNvCxnSpPr>
           <p:nvPr/>
         </p:nvCxnSpPr>
         <p:spPr>
-          <a:xfrm rot="16200000" flipV="1">
-            <a:off x="5093739" y="1678536"/>
-            <a:ext cx="554477" cy="878288"/>
-          </a:xfrm>
-          <a:prstGeom prst="curvedConnector2">
+          <a:xfrm flipH="1">
+            <a:off x="4985812" y="2442153"/>
+            <a:ext cx="178103" cy="0"/>
+          </a:xfrm>
+          <a:prstGeom prst="straightConnector1">
             <a:avLst/>
+          </a:prstGeom>
+          <a:ln>
+            <a:tailEnd type="arrow"/>
+          </a:ln>
+        </p:spPr>
+        <p:style>
+          <a:lnRef idx="2">
+            <a:schemeClr val="dk1"/>
+          </a:lnRef>
+          <a:fillRef idx="1">
+            <a:schemeClr val="lt1"/>
+          </a:fillRef>
+          <a:effectRef idx="0">
+            <a:schemeClr val="dk1"/>
+          </a:effectRef>
+          <a:fontRef idx="minor">
+            <a:schemeClr val="dk1"/>
+          </a:fontRef>
+        </p:style>
+      </p:cxnSp>
+      <p:cxnSp>
+        <p:nvCxnSpPr>
+          <p:cNvPr id="130" name="Curved Connector 129"/>
+          <p:cNvCxnSpPr>
+            <a:stCxn id="22" idx="2"/>
+            <a:endCxn id="62" idx="1"/>
+          </p:cNvCxnSpPr>
+          <p:nvPr/>
+        </p:nvCxnSpPr>
+        <p:spPr>
+          <a:xfrm rot="5400000" flipH="1">
+            <a:off x="3392596" y="1123896"/>
+            <a:ext cx="974725" cy="3611246"/>
+          </a:xfrm>
+          <a:prstGeom prst="bentConnector4">
+            <a:avLst>
+              <a:gd name="adj1" fmla="val -23453"/>
+              <a:gd name="adj2" fmla="val 106330"/>
+            </a:avLst>
           </a:prstGeom>
           <a:ln>
             <a:tailEnd type="arrow"/>

</xml_diff>

<commit_message>
1) Updates to the IODVS presentation 2) Updates to the SDCard state diagram -- not RMW, just W/Verify
</commit_message>
<xml_diff>
--- a/Documentation/Results/IODVS/Flowcharts.pptx
+++ b/Documentation/Results/IODVS/Flowcharts.pptx
@@ -107,6 +107,22 @@
       </a:defRPr>
     </a:lvl9pPr>
   </p:defaultTextStyle>
+  <p:extLst>
+    <p:ext uri="{EFAFB233-063F-42B5-8137-9DF3F51BA10A}">
+      <p15:sldGuideLst xmlns:p15="http://schemas.microsoft.com/office/powerpoint/2012/main">
+        <p15:guide id="1" orient="horz" pos="2160">
+          <p15:clr>
+            <a:srgbClr val="A4A3A4"/>
+          </p15:clr>
+        </p15:guide>
+        <p15:guide id="2" pos="2880">
+          <p15:clr>
+            <a:srgbClr val="A4A3A4"/>
+          </p15:clr>
+        </p15:guide>
+      </p15:sldGuideLst>
+    </p:ext>
+  </p:extLst>
 </p:presentation>
 </file>
 
@@ -291,7 +307,7 @@
           <a:p>
             <a:fld id="{7B943329-1151-9D43-96D9-FAE02A470F34}" type="datetimeFigureOut">
               <a:rPr lang="en-US" smtClean="0"/>
-              <a:t>10/15/2014</a:t>
+              <a:t>10/17/2014</a:t>
             </a:fld>
             <a:endParaRPr lang="en-US"/>
           </a:p>
@@ -461,7 +477,7 @@
           <a:p>
             <a:fld id="{7B943329-1151-9D43-96D9-FAE02A470F34}" type="datetimeFigureOut">
               <a:rPr lang="en-US" smtClean="0"/>
-              <a:t>10/15/2014</a:t>
+              <a:t>10/17/2014</a:t>
             </a:fld>
             <a:endParaRPr lang="en-US"/>
           </a:p>
@@ -641,7 +657,7 @@
           <a:p>
             <a:fld id="{7B943329-1151-9D43-96D9-FAE02A470F34}" type="datetimeFigureOut">
               <a:rPr lang="en-US" smtClean="0"/>
-              <a:t>10/15/2014</a:t>
+              <a:t>10/17/2014</a:t>
             </a:fld>
             <a:endParaRPr lang="en-US"/>
           </a:p>
@@ -811,7 +827,7 @@
           <a:p>
             <a:fld id="{7B943329-1151-9D43-96D9-FAE02A470F34}" type="datetimeFigureOut">
               <a:rPr lang="en-US" smtClean="0"/>
-              <a:t>10/15/2014</a:t>
+              <a:t>10/17/2014</a:t>
             </a:fld>
             <a:endParaRPr lang="en-US"/>
           </a:p>
@@ -1057,7 +1073,7 @@
           <a:p>
             <a:fld id="{7B943329-1151-9D43-96D9-FAE02A470F34}" type="datetimeFigureOut">
               <a:rPr lang="en-US" smtClean="0"/>
-              <a:t>10/15/2014</a:t>
+              <a:t>10/17/2014</a:t>
             </a:fld>
             <a:endParaRPr lang="en-US"/>
           </a:p>
@@ -1345,7 +1361,7 @@
           <a:p>
             <a:fld id="{7B943329-1151-9D43-96D9-FAE02A470F34}" type="datetimeFigureOut">
               <a:rPr lang="en-US" smtClean="0"/>
-              <a:t>10/15/2014</a:t>
+              <a:t>10/17/2014</a:t>
             </a:fld>
             <a:endParaRPr lang="en-US"/>
           </a:p>
@@ -1767,7 +1783,7 @@
           <a:p>
             <a:fld id="{7B943329-1151-9D43-96D9-FAE02A470F34}" type="datetimeFigureOut">
               <a:rPr lang="en-US" smtClean="0"/>
-              <a:t>10/15/2014</a:t>
+              <a:t>10/17/2014</a:t>
             </a:fld>
             <a:endParaRPr lang="en-US"/>
           </a:p>
@@ -1885,7 +1901,7 @@
           <a:p>
             <a:fld id="{7B943329-1151-9D43-96D9-FAE02A470F34}" type="datetimeFigureOut">
               <a:rPr lang="en-US" smtClean="0"/>
-              <a:t>10/15/2014</a:t>
+              <a:t>10/17/2014</a:t>
             </a:fld>
             <a:endParaRPr lang="en-US"/>
           </a:p>
@@ -1980,7 +1996,7 @@
           <a:p>
             <a:fld id="{7B943329-1151-9D43-96D9-FAE02A470F34}" type="datetimeFigureOut">
               <a:rPr lang="en-US" smtClean="0"/>
-              <a:t>10/15/2014</a:t>
+              <a:t>10/17/2014</a:t>
             </a:fld>
             <a:endParaRPr lang="en-US"/>
           </a:p>
@@ -2257,7 +2273,7 @@
           <a:p>
             <a:fld id="{7B943329-1151-9D43-96D9-FAE02A470F34}" type="datetimeFigureOut">
               <a:rPr lang="en-US" smtClean="0"/>
-              <a:t>10/15/2014</a:t>
+              <a:t>10/17/2014</a:t>
             </a:fld>
             <a:endParaRPr lang="en-US"/>
           </a:p>
@@ -2510,7 +2526,7 @@
           <a:p>
             <a:fld id="{7B943329-1151-9D43-96D9-FAE02A470F34}" type="datetimeFigureOut">
               <a:rPr lang="en-US" smtClean="0"/>
-              <a:t>10/15/2014</a:t>
+              <a:t>10/17/2014</a:t>
             </a:fld>
             <a:endParaRPr lang="en-US"/>
           </a:p>
@@ -2723,7 +2739,7 @@
           <a:p>
             <a:fld id="{7B943329-1151-9D43-96D9-FAE02A470F34}" type="datetimeFigureOut">
               <a:rPr lang="en-US" smtClean="0"/>
-              <a:t>10/15/2014</a:t>
+              <a:t>10/17/2014</a:t>
             </a:fld>
             <a:endParaRPr lang="en-US"/>
           </a:p>
@@ -3872,26 +3888,8 @@
                 <a:latin typeface="Times New Roman" panose="02020603050405020304" pitchFamily="18" charset="0"/>
                 <a:cs typeface="Times New Roman" panose="02020603050405020304" pitchFamily="18" charset="0"/>
               </a:rPr>
-              <a:t>Subsector </a:t>
-            </a:r>
-            <a:r>
-              <a:rPr lang="en-US" sz="1200" dirty="0" smtClean="0">
-                <a:latin typeface="Times New Roman" panose="02020603050405020304" pitchFamily="18" charset="0"/>
-                <a:cs typeface="Times New Roman" panose="02020603050405020304" pitchFamily="18" charset="0"/>
-              </a:rPr>
-              <a:t>Erase </a:t>
-            </a:r>
-            <a:r>
-              <a:rPr lang="en-US" sz="1200" dirty="0" smtClean="0">
-                <a:latin typeface="Times New Roman" panose="02020603050405020304" pitchFamily="18" charset="0"/>
-                <a:cs typeface="Times New Roman" panose="02020603050405020304" pitchFamily="18" charset="0"/>
-              </a:rPr>
-              <a:t>Cmd</a:t>
-            </a:r>
-            <a:endParaRPr lang="en-US" sz="1200" dirty="0" smtClean="0">
-              <a:latin typeface="Times New Roman" panose="02020603050405020304" pitchFamily="18" charset="0"/>
-              <a:cs typeface="Times New Roman" panose="02020603050405020304" pitchFamily="18" charset="0"/>
-            </a:endParaRPr>
+              <a:t>Subsector Erase Cmd</a:t>
+            </a:r>
           </a:p>
           <a:p>
             <a:pPr algn="ctr"/>
@@ -3900,14 +3898,7 @@
                 <a:latin typeface="Times New Roman" panose="02020603050405020304" pitchFamily="18" charset="0"/>
                 <a:cs typeface="Times New Roman" panose="02020603050405020304" pitchFamily="18" charset="0"/>
               </a:rPr>
-              <a:t>(4KB, 5us</a:t>
-            </a:r>
-            <a:r>
-              <a:rPr lang="en-US" sz="1000" dirty="0" smtClean="0">
-                <a:latin typeface="Times New Roman" panose="02020603050405020304" pitchFamily="18" charset="0"/>
-                <a:cs typeface="Times New Roman" panose="02020603050405020304" pitchFamily="18" charset="0"/>
-              </a:rPr>
-              <a:t>)</a:t>
+              <a:t>(4KB, 5us)</a:t>
             </a:r>
             <a:endParaRPr lang="en-US" sz="1000" dirty="0">
               <a:latin typeface="Times New Roman" panose="02020603050405020304" pitchFamily="18" charset="0"/>
@@ -3955,14 +3946,7 @@
                 <a:latin typeface="Times New Roman" panose="02020603050405020304" pitchFamily="18" charset="0"/>
                 <a:cs typeface="Times New Roman" panose="02020603050405020304" pitchFamily="18" charset="0"/>
               </a:rPr>
-              <a:t>Subsector Erase </a:t>
-            </a:r>
-            <a:r>
-              <a:rPr lang="en-US" sz="1200" dirty="0" smtClean="0">
-                <a:latin typeface="Times New Roman" panose="02020603050405020304" pitchFamily="18" charset="0"/>
-                <a:cs typeface="Times New Roman" panose="02020603050405020304" pitchFamily="18" charset="0"/>
-              </a:rPr>
-              <a:t>Delay</a:t>
+              <a:t>Subsector Erase Delay</a:t>
             </a:r>
           </a:p>
           <a:p>
@@ -4030,14 +4014,7 @@
                 <a:latin typeface="Times New Roman" panose="02020603050405020304" pitchFamily="18" charset="0"/>
                 <a:cs typeface="Times New Roman" panose="02020603050405020304" pitchFamily="18" charset="0"/>
               </a:rPr>
-              <a:t>(256B, ~800us</a:t>
-            </a:r>
-            <a:r>
-              <a:rPr lang="en-US" sz="1000" dirty="0" smtClean="0">
-                <a:latin typeface="Times New Roman" panose="02020603050405020304" pitchFamily="18" charset="0"/>
-                <a:cs typeface="Times New Roman" panose="02020603050405020304" pitchFamily="18" charset="0"/>
-              </a:rPr>
-              <a:t>)</a:t>
+              <a:t>(256B, ~800us)</a:t>
             </a:r>
             <a:endParaRPr lang="en-US" sz="1000" dirty="0">
               <a:latin typeface="Times New Roman" panose="02020603050405020304" pitchFamily="18" charset="0"/>
@@ -4087,10 +4064,6 @@
               </a:rPr>
               <a:t>Page Write Delay</a:t>
             </a:r>
-            <a:endParaRPr lang="en-US" sz="1200" dirty="0" smtClean="0">
-              <a:latin typeface="Times New Roman" panose="02020603050405020304" pitchFamily="18" charset="0"/>
-              <a:cs typeface="Times New Roman" panose="02020603050405020304" pitchFamily="18" charset="0"/>
-            </a:endParaRPr>
           </a:p>
           <a:p>
             <a:pPr algn="ctr"/>
@@ -4099,14 +4072,7 @@
                 <a:latin typeface="Times New Roman" panose="02020603050405020304" pitchFamily="18" charset="0"/>
                 <a:cs typeface="Times New Roman" panose="02020603050405020304" pitchFamily="18" charset="0"/>
               </a:rPr>
-              <a:t>(5ms</a:t>
-            </a:r>
-            <a:r>
-              <a:rPr lang="en-US" sz="1000" dirty="0" smtClean="0">
-                <a:latin typeface="Times New Roman" panose="02020603050405020304" pitchFamily="18" charset="0"/>
-                <a:cs typeface="Times New Roman" panose="02020603050405020304" pitchFamily="18" charset="0"/>
-              </a:rPr>
-              <a:t>)</a:t>
+              <a:t>(5ms)</a:t>
             </a:r>
             <a:endParaRPr lang="en-US" sz="1000" dirty="0">
               <a:latin typeface="Times New Roman" panose="02020603050405020304" pitchFamily="18" charset="0"/>
@@ -4156,10 +4122,6 @@
               </a:rPr>
               <a:t>Release Deep Power-down</a:t>
             </a:r>
-            <a:endParaRPr lang="en-US" sz="1200" dirty="0" smtClean="0">
-              <a:latin typeface="Times New Roman" panose="02020603050405020304" pitchFamily="18" charset="0"/>
-              <a:cs typeface="Times New Roman" panose="02020603050405020304" pitchFamily="18" charset="0"/>
-            </a:endParaRPr>
           </a:p>
           <a:p>
             <a:pPr algn="ctr"/>
@@ -4168,14 +4130,7 @@
                 <a:latin typeface="Times New Roman" panose="02020603050405020304" pitchFamily="18" charset="0"/>
                 <a:cs typeface="Times New Roman" panose="02020603050405020304" pitchFamily="18" charset="0"/>
               </a:rPr>
-              <a:t>(~30us</a:t>
-            </a:r>
-            <a:r>
-              <a:rPr lang="en-US" sz="1000" dirty="0" smtClean="0">
-                <a:latin typeface="Times New Roman" panose="02020603050405020304" pitchFamily="18" charset="0"/>
-                <a:cs typeface="Times New Roman" panose="02020603050405020304" pitchFamily="18" charset="0"/>
-              </a:rPr>
-              <a:t>)</a:t>
+              <a:t>(~30us)</a:t>
             </a:r>
             <a:endParaRPr lang="en-US" sz="1000" dirty="0">
               <a:latin typeface="Times New Roman" panose="02020603050405020304" pitchFamily="18" charset="0"/>
@@ -4701,14 +4656,7 @@
                 <a:latin typeface="Times New Roman" panose="02020603050405020304" pitchFamily="18" charset="0"/>
                 <a:cs typeface="Times New Roman" panose="02020603050405020304" pitchFamily="18" charset="0"/>
               </a:rPr>
-              <a:t>Power </a:t>
-            </a:r>
-            <a:r>
-              <a:rPr lang="en-US" sz="1200" dirty="0" smtClean="0">
-                <a:latin typeface="Times New Roman" panose="02020603050405020304" pitchFamily="18" charset="0"/>
-                <a:cs typeface="Times New Roman" panose="02020603050405020304" pitchFamily="18" charset="0"/>
-              </a:rPr>
-              <a:t>Up</a:t>
+              <a:t>Power Up</a:t>
             </a:r>
           </a:p>
           <a:p>
@@ -4793,7 +4741,7 @@
         </p:nvSpPr>
         <p:spPr>
           <a:xfrm>
-            <a:off x="3697887" y="3103930"/>
+            <a:off x="2207688" y="3103930"/>
             <a:ext cx="1115350" cy="539750"/>
           </a:xfrm>
           <a:prstGeom prst="flowChartAlternateProcess">
@@ -4935,7 +4883,7 @@
         </p:nvSpPr>
         <p:spPr>
           <a:xfrm>
-            <a:off x="2161096" y="3103929"/>
+            <a:off x="2207688" y="2387889"/>
             <a:ext cx="1365250" cy="539750"/>
           </a:xfrm>
           <a:prstGeom prst="flowChartAlternateProcess">
@@ -4985,113 +4933,19 @@
           </a:p>
         </p:txBody>
       </p:sp>
-      <p:sp>
-        <p:nvSpPr>
-          <p:cNvPr id="12" name="Alternate Process 11"/>
-          <p:cNvSpPr/>
-          <p:nvPr/>
-        </p:nvSpPr>
-        <p:spPr>
-          <a:xfrm>
-            <a:off x="5046368" y="3103929"/>
-            <a:ext cx="682624" cy="539750"/>
-          </a:xfrm>
-          <a:prstGeom prst="flowChartAlternateProcess">
-            <a:avLst/>
-          </a:prstGeom>
-        </p:spPr>
-        <p:style>
-          <a:lnRef idx="2">
-            <a:schemeClr val="dk1"/>
-          </a:lnRef>
-          <a:fillRef idx="1">
-            <a:schemeClr val="lt1"/>
-          </a:fillRef>
-          <a:effectRef idx="0">
-            <a:schemeClr val="dk1"/>
-          </a:effectRef>
-          <a:fontRef idx="minor">
-            <a:schemeClr val="dk1"/>
-          </a:fontRef>
-        </p:style>
-        <p:txBody>
-          <a:bodyPr rtlCol="0" anchor="ctr"/>
-          <a:lstStyle/>
-          <a:p>
-            <a:pPr algn="ctr"/>
-            <a:r>
-              <a:rPr lang="en-US" sz="1200" dirty="0" smtClean="0">
-                <a:latin typeface="Times New Roman" panose="02020603050405020304" pitchFamily="18" charset="0"/>
-                <a:cs typeface="Times New Roman" panose="02020603050405020304" pitchFamily="18" charset="0"/>
-              </a:rPr>
-              <a:t>Verify</a:t>
-            </a:r>
-          </a:p>
-          <a:p>
-            <a:pPr algn="ctr"/>
-            <a:r>
-              <a:rPr lang="en-US" sz="1000" dirty="0" smtClean="0">
-                <a:latin typeface="Times New Roman" panose="02020603050405020304" pitchFamily="18" charset="0"/>
-                <a:cs typeface="Times New Roman" panose="02020603050405020304" pitchFamily="18" charset="0"/>
-              </a:rPr>
-              <a:t>(~1ms)</a:t>
-            </a:r>
-            <a:endParaRPr lang="en-US" sz="1000" dirty="0">
-              <a:latin typeface="Times New Roman" panose="02020603050405020304" pitchFamily="18" charset="0"/>
-              <a:cs typeface="Times New Roman" panose="02020603050405020304" pitchFamily="18" charset="0"/>
-            </a:endParaRPr>
-          </a:p>
-        </p:txBody>
-      </p:sp>
-      <p:cxnSp>
-        <p:nvCxnSpPr>
-          <p:cNvPr id="22" name="Curved Connector 21"/>
-          <p:cNvCxnSpPr>
-            <a:stCxn id="12" idx="0"/>
-            <a:endCxn id="62" idx="3"/>
-          </p:cNvCxnSpPr>
-          <p:nvPr/>
-        </p:nvCxnSpPr>
-        <p:spPr>
-          <a:xfrm rot="16200000" flipV="1">
-            <a:off x="4769199" y="2485446"/>
-            <a:ext cx="446165" cy="790807"/>
-          </a:xfrm>
-          <a:prstGeom prst="curvedConnector2">
-            <a:avLst/>
-          </a:prstGeom>
-          <a:ln>
-            <a:tailEnd type="arrow"/>
-          </a:ln>
-        </p:spPr>
-        <p:style>
-          <a:lnRef idx="2">
-            <a:schemeClr val="dk1"/>
-          </a:lnRef>
-          <a:fillRef idx="1">
-            <a:schemeClr val="lt1"/>
-          </a:fillRef>
-          <a:effectRef idx="0">
-            <a:schemeClr val="dk1"/>
-          </a:effectRef>
-          <a:fontRef idx="minor">
-            <a:schemeClr val="dk1"/>
-          </a:fontRef>
-        </p:style>
-      </p:cxnSp>
       <p:cxnSp>
         <p:nvCxnSpPr>
           <p:cNvPr id="8" name="Straight Arrow Connector 7"/>
           <p:cNvCxnSpPr>
-            <a:stCxn id="21" idx="3"/>
-            <a:endCxn id="7" idx="1"/>
+            <a:stCxn id="62" idx="1"/>
+            <a:endCxn id="21" idx="3"/>
           </p:cNvCxnSpPr>
           <p:nvPr/>
         </p:nvCxnSpPr>
         <p:spPr>
-          <a:xfrm>
-            <a:off x="3526347" y="3373810"/>
-            <a:ext cx="171543" cy="1"/>
+          <a:xfrm flipH="1">
+            <a:off x="3572938" y="2657764"/>
+            <a:ext cx="341310" cy="0"/>
           </a:xfrm>
           <a:prstGeom prst="straightConnector1">
             <a:avLst/>
@@ -5120,14 +4974,13 @@
           <p:cNvPr id="13" name="Straight Arrow Connector 12"/>
           <p:cNvCxnSpPr>
             <a:stCxn id="7" idx="3"/>
-            <a:endCxn id="12" idx="1"/>
           </p:cNvCxnSpPr>
           <p:nvPr/>
         </p:nvCxnSpPr>
         <p:spPr>
           <a:xfrm flipV="1">
-            <a:off x="4813240" y="3373810"/>
-            <a:ext cx="233131" cy="1"/>
+            <a:off x="3323038" y="3373804"/>
+            <a:ext cx="233130" cy="1"/>
           </a:xfrm>
           <a:prstGeom prst="straightConnector1">
             <a:avLst/>
@@ -5162,7 +5015,7 @@
         </p:nvCxnSpPr>
         <p:spPr>
           <a:xfrm flipH="1">
-            <a:off x="4255562" y="3373805"/>
+            <a:off x="2765363" y="3373805"/>
             <a:ext cx="557676" cy="269875"/>
           </a:xfrm>
           <a:prstGeom prst="bentConnector4">
@@ -5234,8 +5087,8 @@
         </p:nvSpPr>
         <p:spPr>
           <a:xfrm>
-            <a:off x="4363746" y="1504522"/>
-            <a:ext cx="1365250" cy="539750"/>
+            <a:off x="3702002" y="1491562"/>
+            <a:ext cx="1107125" cy="539750"/>
           </a:xfrm>
           <a:prstGeom prst="flowChartAlternateProcess">
             <a:avLst/>
@@ -5265,7 +5118,14 @@
                 <a:latin typeface="Times New Roman" panose="02020603050405020304" pitchFamily="18" charset="0"/>
                 <a:cs typeface="Times New Roman" panose="02020603050405020304" pitchFamily="18" charset="0"/>
               </a:rPr>
-              <a:t>Enter / Exit Power Down</a:t>
+              <a:t>Enter / Exit Power </a:t>
+            </a:r>
+            <a:r>
+              <a:rPr lang="en-US" sz="1200" dirty="0" smtClean="0">
+                <a:latin typeface="Times New Roman" panose="02020603050405020304" pitchFamily="18" charset="0"/>
+                <a:cs typeface="Times New Roman" panose="02020603050405020304" pitchFamily="18" charset="0"/>
+              </a:rPr>
+              <a:t>Down</a:t>
             </a:r>
             <a:r>
               <a:rPr lang="en-US" sz="1000" dirty="0" smtClean="0">
@@ -5292,8 +5152,8 @@
         </p:nvCxnSpPr>
         <p:spPr>
           <a:xfrm rot="5400000">
-            <a:off x="4479160" y="1820680"/>
-            <a:ext cx="343617" cy="790807"/>
+            <a:off x="4077275" y="2209598"/>
+            <a:ext cx="356577" cy="4"/>
           </a:xfrm>
           <a:prstGeom prst="bentConnector3">
             <a:avLst/>
@@ -5326,7 +5186,7 @@
         </p:nvSpPr>
         <p:spPr>
           <a:xfrm>
-            <a:off x="2161096" y="2387889"/>
+            <a:off x="3572940" y="3101044"/>
             <a:ext cx="1365250" cy="539750"/>
           </a:xfrm>
           <a:prstGeom prst="flowChartAlternateProcess">
@@ -5357,8 +5217,19 @@
                 <a:latin typeface="Times New Roman" panose="02020603050405020304" pitchFamily="18" charset="0"/>
                 <a:cs typeface="Times New Roman" panose="02020603050405020304" pitchFamily="18" charset="0"/>
               </a:rPr>
-              <a:t>Read Cmd / Data</a:t>
-            </a:r>
+              <a:t>Read </a:t>
+            </a:r>
+            <a:r>
+              <a:rPr lang="en-US" sz="1200" dirty="0" smtClean="0">
+                <a:latin typeface="Times New Roman" panose="02020603050405020304" pitchFamily="18" charset="0"/>
+                <a:cs typeface="Times New Roman" panose="02020603050405020304" pitchFamily="18" charset="0"/>
+              </a:rPr>
+              <a:t>(Verify)</a:t>
+            </a:r>
+            <a:endParaRPr lang="en-US" sz="1200" dirty="0" smtClean="0">
+              <a:latin typeface="Times New Roman" panose="02020603050405020304" pitchFamily="18" charset="0"/>
+              <a:cs typeface="Times New Roman" panose="02020603050405020304" pitchFamily="18" charset="0"/>
+            </a:endParaRPr>
           </a:p>
           <a:p>
             <a:pPr algn="ctr"/>
@@ -5378,53 +5249,17 @@
       </p:sp>
       <p:cxnSp>
         <p:nvCxnSpPr>
-          <p:cNvPr id="42" name="Straight Arrow Connector 41"/>
+          <p:cNvPr id="27" name="Straight Arrow Connector 26"/>
           <p:cNvCxnSpPr>
-            <a:stCxn id="41" idx="2"/>
-            <a:endCxn id="21" idx="0"/>
+            <a:stCxn id="41" idx="0"/>
+            <a:endCxn id="62" idx="2"/>
           </p:cNvCxnSpPr>
           <p:nvPr/>
         </p:nvCxnSpPr>
         <p:spPr>
-          <a:xfrm>
-            <a:off x="2843719" y="2927639"/>
-            <a:ext cx="0" cy="176290"/>
-          </a:xfrm>
-          <a:prstGeom prst="straightConnector1">
-            <a:avLst/>
-          </a:prstGeom>
-          <a:ln>
-            <a:tailEnd type="arrow"/>
-          </a:ln>
-        </p:spPr>
-        <p:style>
-          <a:lnRef idx="2">
-            <a:schemeClr val="dk1"/>
-          </a:lnRef>
-          <a:fillRef idx="1">
-            <a:schemeClr val="lt1"/>
-          </a:fillRef>
-          <a:effectRef idx="0">
-            <a:schemeClr val="dk1"/>
-          </a:effectRef>
-          <a:fontRef idx="minor">
-            <a:schemeClr val="dk1"/>
-          </a:fontRef>
-        </p:style>
-      </p:cxnSp>
-      <p:cxnSp>
-        <p:nvCxnSpPr>
-          <p:cNvPr id="45" name="Straight Arrow Connector 44"/>
-          <p:cNvCxnSpPr>
-            <a:stCxn id="62" idx="1"/>
-            <a:endCxn id="41" idx="3"/>
-          </p:cNvCxnSpPr>
-          <p:nvPr/>
-        </p:nvCxnSpPr>
-        <p:spPr>
-          <a:xfrm flipH="1">
-            <a:off x="3526344" y="2657764"/>
-            <a:ext cx="387904" cy="0"/>
+          <a:xfrm flipH="1" flipV="1">
+            <a:off x="4255561" y="2927639"/>
+            <a:ext cx="4" cy="173405"/>
           </a:xfrm>
           <a:prstGeom prst="straightConnector1">
             <a:avLst/>
@@ -5524,14 +5359,7 @@
                 <a:latin typeface="Times New Roman" panose="02020603050405020304" pitchFamily="18" charset="0"/>
                 <a:cs typeface="Times New Roman" panose="02020603050405020304" pitchFamily="18" charset="0"/>
               </a:rPr>
-              <a:t>Power </a:t>
-            </a:r>
-            <a:r>
-              <a:rPr lang="en-US" sz="1200" dirty="0" smtClean="0">
-                <a:latin typeface="Times New Roman" panose="02020603050405020304" pitchFamily="18" charset="0"/>
-                <a:cs typeface="Times New Roman" panose="02020603050405020304" pitchFamily="18" charset="0"/>
-              </a:rPr>
-              <a:t>Up</a:t>
+              <a:t>Power Up</a:t>
             </a:r>
           </a:p>
           <a:p>
@@ -5799,14 +5627,7 @@
                 <a:latin typeface="Times New Roman" panose="02020603050405020304" pitchFamily="18" charset="0"/>
                 <a:cs typeface="Times New Roman" panose="02020603050405020304" pitchFamily="18" charset="0"/>
               </a:rPr>
-              <a:t>Data </a:t>
-            </a:r>
-            <a:r>
-              <a:rPr lang="en-US" sz="1200" dirty="0" smtClean="0">
-                <a:latin typeface="Times New Roman" panose="02020603050405020304" pitchFamily="18" charset="0"/>
-                <a:cs typeface="Times New Roman" panose="02020603050405020304" pitchFamily="18" charset="0"/>
-              </a:rPr>
-              <a:t>Ready</a:t>
+              <a:t>Data Ready</a:t>
             </a:r>
             <a:endParaRPr lang="en-US" sz="1200" dirty="0">
               <a:latin typeface="Times New Roman" panose="02020603050405020304" pitchFamily="18" charset="0"/>

</xml_diff>

<commit_message>
1) Updates to the RTAS paper -- now on RevF thanks to another MSWord crash... 2) Added an arrow to the Flowcharts.pptx 3) More work on EnergyAnalysis.xlsx
</commit_message>
<xml_diff>
--- a/Documentation/Results/IODVS/Flowcharts.pptx
+++ b/Documentation/Results/IODVS/Flowcharts.pptx
@@ -307,7 +307,7 @@
           <a:p>
             <a:fld id="{7B943329-1151-9D43-96D9-FAE02A470F34}" type="datetimeFigureOut">
               <a:rPr lang="en-US" smtClean="0"/>
-              <a:t>10/17/2014</a:t>
+              <a:t>10/20/2014</a:t>
             </a:fld>
             <a:endParaRPr lang="en-US"/>
           </a:p>
@@ -477,7 +477,7 @@
           <a:p>
             <a:fld id="{7B943329-1151-9D43-96D9-FAE02A470F34}" type="datetimeFigureOut">
               <a:rPr lang="en-US" smtClean="0"/>
-              <a:t>10/17/2014</a:t>
+              <a:t>10/20/2014</a:t>
             </a:fld>
             <a:endParaRPr lang="en-US"/>
           </a:p>
@@ -657,7 +657,7 @@
           <a:p>
             <a:fld id="{7B943329-1151-9D43-96D9-FAE02A470F34}" type="datetimeFigureOut">
               <a:rPr lang="en-US" smtClean="0"/>
-              <a:t>10/17/2014</a:t>
+              <a:t>10/20/2014</a:t>
             </a:fld>
             <a:endParaRPr lang="en-US"/>
           </a:p>
@@ -827,7 +827,7 @@
           <a:p>
             <a:fld id="{7B943329-1151-9D43-96D9-FAE02A470F34}" type="datetimeFigureOut">
               <a:rPr lang="en-US" smtClean="0"/>
-              <a:t>10/17/2014</a:t>
+              <a:t>10/20/2014</a:t>
             </a:fld>
             <a:endParaRPr lang="en-US"/>
           </a:p>
@@ -1073,7 +1073,7 @@
           <a:p>
             <a:fld id="{7B943329-1151-9D43-96D9-FAE02A470F34}" type="datetimeFigureOut">
               <a:rPr lang="en-US" smtClean="0"/>
-              <a:t>10/17/2014</a:t>
+              <a:t>10/20/2014</a:t>
             </a:fld>
             <a:endParaRPr lang="en-US"/>
           </a:p>
@@ -1361,7 +1361,7 @@
           <a:p>
             <a:fld id="{7B943329-1151-9D43-96D9-FAE02A470F34}" type="datetimeFigureOut">
               <a:rPr lang="en-US" smtClean="0"/>
-              <a:t>10/17/2014</a:t>
+              <a:t>10/20/2014</a:t>
             </a:fld>
             <a:endParaRPr lang="en-US"/>
           </a:p>
@@ -1783,7 +1783,7 @@
           <a:p>
             <a:fld id="{7B943329-1151-9D43-96D9-FAE02A470F34}" type="datetimeFigureOut">
               <a:rPr lang="en-US" smtClean="0"/>
-              <a:t>10/17/2014</a:t>
+              <a:t>10/20/2014</a:t>
             </a:fld>
             <a:endParaRPr lang="en-US"/>
           </a:p>
@@ -1901,7 +1901,7 @@
           <a:p>
             <a:fld id="{7B943329-1151-9D43-96D9-FAE02A470F34}" type="datetimeFigureOut">
               <a:rPr lang="en-US" smtClean="0"/>
-              <a:t>10/17/2014</a:t>
+              <a:t>10/20/2014</a:t>
             </a:fld>
             <a:endParaRPr lang="en-US"/>
           </a:p>
@@ -1996,7 +1996,7 @@
           <a:p>
             <a:fld id="{7B943329-1151-9D43-96D9-FAE02A470F34}" type="datetimeFigureOut">
               <a:rPr lang="en-US" smtClean="0"/>
-              <a:t>10/17/2014</a:t>
+              <a:t>10/20/2014</a:t>
             </a:fld>
             <a:endParaRPr lang="en-US"/>
           </a:p>
@@ -2273,7 +2273,7 @@
           <a:p>
             <a:fld id="{7B943329-1151-9D43-96D9-FAE02A470F34}" type="datetimeFigureOut">
               <a:rPr lang="en-US" smtClean="0"/>
-              <a:t>10/17/2014</a:t>
+              <a:t>10/20/2014</a:t>
             </a:fld>
             <a:endParaRPr lang="en-US"/>
           </a:p>
@@ -2526,7 +2526,7 @@
           <a:p>
             <a:fld id="{7B943329-1151-9D43-96D9-FAE02A470F34}" type="datetimeFigureOut">
               <a:rPr lang="en-US" smtClean="0"/>
-              <a:t>10/17/2014</a:t>
+              <a:t>10/20/2014</a:t>
             </a:fld>
             <a:endParaRPr lang="en-US"/>
           </a:p>
@@ -2739,7 +2739,7 @@
           <a:p>
             <a:fld id="{7B943329-1151-9D43-96D9-FAE02A470F34}" type="datetimeFigureOut">
               <a:rPr lang="en-US" smtClean="0"/>
-              <a:t>10/17/2014</a:t>
+              <a:t>10/20/2014</a:t>
             </a:fld>
             <a:endParaRPr lang="en-US"/>
           </a:p>
@@ -4741,7 +4741,7 @@
         </p:nvSpPr>
         <p:spPr>
           <a:xfrm>
-            <a:off x="2207688" y="3103930"/>
+            <a:off x="2332638" y="3103930"/>
             <a:ext cx="1115350" cy="539750"/>
           </a:xfrm>
           <a:prstGeom prst="flowChartAlternateProcess">
@@ -4979,7 +4979,7 @@
         </p:nvCxnSpPr>
         <p:spPr>
           <a:xfrm flipV="1">
-            <a:off x="3323038" y="3373804"/>
+            <a:off x="3447988" y="3373804"/>
             <a:ext cx="233130" cy="1"/>
           </a:xfrm>
           <a:prstGeom prst="straightConnector1">
@@ -5015,8 +5015,8 @@
         </p:nvCxnSpPr>
         <p:spPr>
           <a:xfrm flipH="1">
-            <a:off x="2765363" y="3373805"/>
-            <a:ext cx="557676" cy="269875"/>
+            <a:off x="2890313" y="3373805"/>
+            <a:ext cx="557675" cy="269875"/>
           </a:xfrm>
           <a:prstGeom prst="bentConnector4">
             <a:avLst>
@@ -5118,14 +5118,7 @@
                 <a:latin typeface="Times New Roman" panose="02020603050405020304" pitchFamily="18" charset="0"/>
                 <a:cs typeface="Times New Roman" panose="02020603050405020304" pitchFamily="18" charset="0"/>
               </a:rPr>
-              <a:t>Enter / Exit Power </a:t>
-            </a:r>
-            <a:r>
-              <a:rPr lang="en-US" sz="1200" dirty="0" smtClean="0">
-                <a:latin typeface="Times New Roman" panose="02020603050405020304" pitchFamily="18" charset="0"/>
-                <a:cs typeface="Times New Roman" panose="02020603050405020304" pitchFamily="18" charset="0"/>
-              </a:rPr>
-              <a:t>Down</a:t>
+              <a:t>Enter / Exit Power Down</a:t>
             </a:r>
             <a:r>
               <a:rPr lang="en-US" sz="1000" dirty="0" smtClean="0">
@@ -5186,8 +5179,8 @@
         </p:nvSpPr>
         <p:spPr>
           <a:xfrm>
-            <a:off x="3572940" y="3101044"/>
-            <a:ext cx="1365250" cy="539750"/>
+            <a:off x="3702002" y="3101044"/>
+            <a:ext cx="1098578" cy="539750"/>
           </a:xfrm>
           <a:prstGeom prst="flowChartAlternateProcess">
             <a:avLst/>
@@ -5217,19 +5210,8 @@
                 <a:latin typeface="Times New Roman" panose="02020603050405020304" pitchFamily="18" charset="0"/>
                 <a:cs typeface="Times New Roman" panose="02020603050405020304" pitchFamily="18" charset="0"/>
               </a:rPr>
-              <a:t>Read </a:t>
-            </a:r>
-            <a:r>
-              <a:rPr lang="en-US" sz="1200" dirty="0" smtClean="0">
-                <a:latin typeface="Times New Roman" panose="02020603050405020304" pitchFamily="18" charset="0"/>
-                <a:cs typeface="Times New Roman" panose="02020603050405020304" pitchFamily="18" charset="0"/>
-              </a:rPr>
-              <a:t>(Verify)</a:t>
-            </a:r>
-            <a:endParaRPr lang="en-US" sz="1200" dirty="0" smtClean="0">
-              <a:latin typeface="Times New Roman" panose="02020603050405020304" pitchFamily="18" charset="0"/>
-              <a:cs typeface="Times New Roman" panose="02020603050405020304" pitchFamily="18" charset="0"/>
-            </a:endParaRPr>
+              <a:t>Read (Verify)</a:t>
+            </a:r>
           </a:p>
           <a:p>
             <a:pPr algn="ctr"/>
@@ -5257,9 +5239,45 @@
           <p:nvPr/>
         </p:nvCxnSpPr>
         <p:spPr>
-          <a:xfrm flipH="1" flipV="1">
-            <a:off x="4255561" y="2927639"/>
-            <a:ext cx="4" cy="173405"/>
+          <a:xfrm flipV="1">
+            <a:off x="4251291" y="2927639"/>
+            <a:ext cx="4270" cy="173405"/>
+          </a:xfrm>
+          <a:prstGeom prst="straightConnector1">
+            <a:avLst/>
+          </a:prstGeom>
+          <a:ln>
+            <a:tailEnd type="arrow"/>
+          </a:ln>
+        </p:spPr>
+        <p:style>
+          <a:lnRef idx="2">
+            <a:schemeClr val="dk1"/>
+          </a:lnRef>
+          <a:fillRef idx="1">
+            <a:schemeClr val="lt1"/>
+          </a:fillRef>
+          <a:effectRef idx="0">
+            <a:schemeClr val="dk1"/>
+          </a:effectRef>
+          <a:fontRef idx="minor">
+            <a:schemeClr val="dk1"/>
+          </a:fontRef>
+        </p:style>
+      </p:cxnSp>
+      <p:cxnSp>
+        <p:nvCxnSpPr>
+          <p:cNvPr id="16" name="Straight Arrow Connector 15"/>
+          <p:cNvCxnSpPr>
+            <a:stCxn id="21" idx="2"/>
+            <a:endCxn id="7" idx="0"/>
+          </p:cNvCxnSpPr>
+          <p:nvPr/>
+        </p:nvCxnSpPr>
+        <p:spPr>
+          <a:xfrm>
+            <a:off x="2890313" y="2927639"/>
+            <a:ext cx="0" cy="176291"/>
           </a:xfrm>
           <a:prstGeom prst="straightConnector1">
             <a:avLst/>

</xml_diff>